<commit_message>
efa presentaiton almost done
</commit_message>
<xml_diff>
--- a/SEM_presentation/01_efa/image/slide_logos.pptx
+++ b/SEM_presentation/01_efa/image/slide_logos.pptx
@@ -7,6 +7,7 @@
   <p:sldIdLst>
     <p:sldId id="256" r:id="rId2"/>
     <p:sldId id="257" r:id="rId3"/>
+    <p:sldId id="258" r:id="rId4"/>
   </p:sldIdLst>
   <p:sldSz cx="12192000" cy="6858000"/>
   <p:notesSz cx="6858000" cy="9144000"/>
@@ -105,7 +106,73 @@
       </a:defRPr>
     </a:lvl9pPr>
   </p:defaultTextStyle>
+  <p:extLst>
+    <p:ext uri="{EFAFB233-063F-42B5-8137-9DF3F51BA10A}">
+      <p15:sldGuideLst xmlns:p15="http://schemas.microsoft.com/office/powerpoint/2012/main"/>
+    </p:ext>
+  </p:extLst>
 </p:presentation>
+</file>
+
+<file path=ppt/revisionInfo.xml><?xml version="1.0" encoding="utf-8"?>
+<p1510:revInfo xmlns:a="http://schemas.openxmlformats.org/drawingml/2006/main" xmlns:r="http://schemas.openxmlformats.org/officeDocument/2006/relationships" xmlns:p1510="http://schemas.microsoft.com/office/powerpoint/2015/10/main">
+  <p1510:revLst>
+    <p1510:client id="{5AC45C88-7A94-46F3-BAC5-161FFDB890F3}" v="3" dt="2021-08-04T04:32:29.532"/>
+  </p1510:revLst>
+</p1510:revInfo>
+</file>
+
+<file path=ppt/changesInfos/changesInfo1.xml><?xml version="1.0" encoding="utf-8"?>
+<pc:chgInfo xmlns:a="http://schemas.openxmlformats.org/drawingml/2006/main" xmlns:r="http://schemas.openxmlformats.org/officeDocument/2006/relationships" xmlns:ac="http://schemas.microsoft.com/office/drawing/2013/main/command" xmlns:pc="http://schemas.microsoft.com/office/powerpoint/2013/main/command">
+  <pc:docChgLst>
+    <pc:chgData name="CHRISTOPHER LLONES" userId="ee08fdad-24ed-4713-bb77-380897b11f62" providerId="ADAL" clId="{5AC45C88-7A94-46F3-BAC5-161FFDB890F3}"/>
+    <pc:docChg chg="custSel addSld modSld">
+      <pc:chgData name="CHRISTOPHER LLONES" userId="ee08fdad-24ed-4713-bb77-380897b11f62" providerId="ADAL" clId="{5AC45C88-7A94-46F3-BAC5-161FFDB890F3}" dt="2021-08-04T04:32:29.531" v="4" actId="5736"/>
+      <pc:docMkLst>
+        <pc:docMk/>
+      </pc:docMkLst>
+      <pc:sldChg chg="addSp delSp modSp new mod">
+        <pc:chgData name="CHRISTOPHER LLONES" userId="ee08fdad-24ed-4713-bb77-380897b11f62" providerId="ADAL" clId="{5AC45C88-7A94-46F3-BAC5-161FFDB890F3}" dt="2021-08-04T04:32:29.531" v="4" actId="5736"/>
+        <pc:sldMkLst>
+          <pc:docMk/>
+          <pc:sldMk cId="1579710484" sldId="258"/>
+        </pc:sldMkLst>
+        <pc:spChg chg="del">
+          <ac:chgData name="CHRISTOPHER LLONES" userId="ee08fdad-24ed-4713-bb77-380897b11f62" providerId="ADAL" clId="{5AC45C88-7A94-46F3-BAC5-161FFDB890F3}" dt="2021-08-04T04:31:56.551" v="2" actId="478"/>
+          <ac:spMkLst>
+            <pc:docMk/>
+            <pc:sldMk cId="1579710484" sldId="258"/>
+            <ac:spMk id="2" creationId="{FB562C75-0D2D-45C2-8458-917D141A8ED9}"/>
+          </ac:spMkLst>
+        </pc:spChg>
+        <pc:spChg chg="del">
+          <ac:chgData name="CHRISTOPHER LLONES" userId="ee08fdad-24ed-4713-bb77-380897b11f62" providerId="ADAL" clId="{5AC45C88-7A94-46F3-BAC5-161FFDB890F3}" dt="2021-08-04T04:31:56.551" v="2" actId="478"/>
+          <ac:spMkLst>
+            <pc:docMk/>
+            <pc:sldMk cId="1579710484" sldId="258"/>
+            <ac:spMk id="3" creationId="{634EE345-A15C-47E2-89B0-3FF7EBCB43DF}"/>
+          </ac:spMkLst>
+        </pc:spChg>
+        <pc:graphicFrameChg chg="add del mod">
+          <ac:chgData name="CHRISTOPHER LLONES" userId="ee08fdad-24ed-4713-bb77-380897b11f62" providerId="ADAL" clId="{5AC45C88-7A94-46F3-BAC5-161FFDB890F3}" dt="2021-08-04T04:31:56.551" v="2" actId="478"/>
+          <ac:graphicFrameMkLst>
+            <pc:docMk/>
+            <pc:sldMk cId="1579710484" sldId="258"/>
+            <ac:graphicFrameMk id="4" creationId="{2EC2FAC0-6432-4675-93C8-125574BC42B1}"/>
+          </ac:graphicFrameMkLst>
+        </pc:graphicFrameChg>
+        <pc:graphicFrameChg chg="add mod">
+          <ac:chgData name="CHRISTOPHER LLONES" userId="ee08fdad-24ed-4713-bb77-380897b11f62" providerId="ADAL" clId="{5AC45C88-7A94-46F3-BAC5-161FFDB890F3}" dt="2021-08-04T04:32:29.531" v="4" actId="5736"/>
+          <ac:graphicFrameMkLst>
+            <pc:docMk/>
+            <pc:sldMk cId="1579710484" sldId="258"/>
+            <ac:graphicFrameMk id="5" creationId="{DD7DCB67-FF56-41DA-A1D8-ECE9C2881C86}"/>
+          </ac:graphicFrameMkLst>
+        </pc:graphicFrameChg>
+      </pc:sldChg>
+    </pc:docChg>
+  </pc:docChgLst>
+</pc:chgInfo>
 </file>
 
 <file path=ppt/slideLayouts/slideLayout1.xml><?xml version="1.0" encoding="utf-8"?>
@@ -257,7 +324,7 @@
           <a:p>
             <a:fld id="{A7E68E60-9218-46BB-A378-9A469EA0EEDE}" type="datetimeFigureOut">
               <a:rPr lang="en-GB" smtClean="0"/>
-              <a:t>25/07/2021</a:t>
+              <a:t>04/08/2021</a:t>
             </a:fld>
             <a:endParaRPr lang="en-GB"/>
           </a:p>
@@ -457,7 +524,7 @@
           <a:p>
             <a:fld id="{A7E68E60-9218-46BB-A378-9A469EA0EEDE}" type="datetimeFigureOut">
               <a:rPr lang="en-GB" smtClean="0"/>
-              <a:t>25/07/2021</a:t>
+              <a:t>04/08/2021</a:t>
             </a:fld>
             <a:endParaRPr lang="en-GB"/>
           </a:p>
@@ -667,7 +734,7 @@
           <a:p>
             <a:fld id="{A7E68E60-9218-46BB-A378-9A469EA0EEDE}" type="datetimeFigureOut">
               <a:rPr lang="en-GB" smtClean="0"/>
-              <a:t>25/07/2021</a:t>
+              <a:t>04/08/2021</a:t>
             </a:fld>
             <a:endParaRPr lang="en-GB"/>
           </a:p>
@@ -867,7 +934,7 @@
           <a:p>
             <a:fld id="{A7E68E60-9218-46BB-A378-9A469EA0EEDE}" type="datetimeFigureOut">
               <a:rPr lang="en-GB" smtClean="0"/>
-              <a:t>25/07/2021</a:t>
+              <a:t>04/08/2021</a:t>
             </a:fld>
             <a:endParaRPr lang="en-GB"/>
           </a:p>
@@ -1143,7 +1210,7 @@
           <a:p>
             <a:fld id="{A7E68E60-9218-46BB-A378-9A469EA0EEDE}" type="datetimeFigureOut">
               <a:rPr lang="en-GB" smtClean="0"/>
-              <a:t>25/07/2021</a:t>
+              <a:t>04/08/2021</a:t>
             </a:fld>
             <a:endParaRPr lang="en-GB"/>
           </a:p>
@@ -1411,7 +1478,7 @@
           <a:p>
             <a:fld id="{A7E68E60-9218-46BB-A378-9A469EA0EEDE}" type="datetimeFigureOut">
               <a:rPr lang="en-GB" smtClean="0"/>
-              <a:t>25/07/2021</a:t>
+              <a:t>04/08/2021</a:t>
             </a:fld>
             <a:endParaRPr lang="en-GB"/>
           </a:p>
@@ -1826,7 +1893,7 @@
           <a:p>
             <a:fld id="{A7E68E60-9218-46BB-A378-9A469EA0EEDE}" type="datetimeFigureOut">
               <a:rPr lang="en-GB" smtClean="0"/>
-              <a:t>25/07/2021</a:t>
+              <a:t>04/08/2021</a:t>
             </a:fld>
             <a:endParaRPr lang="en-GB"/>
           </a:p>
@@ -1968,7 +2035,7 @@
           <a:p>
             <a:fld id="{A7E68E60-9218-46BB-A378-9A469EA0EEDE}" type="datetimeFigureOut">
               <a:rPr lang="en-GB" smtClean="0"/>
-              <a:t>25/07/2021</a:t>
+              <a:t>04/08/2021</a:t>
             </a:fld>
             <a:endParaRPr lang="en-GB"/>
           </a:p>
@@ -2081,7 +2148,7 @@
           <a:p>
             <a:fld id="{A7E68E60-9218-46BB-A378-9A469EA0EEDE}" type="datetimeFigureOut">
               <a:rPr lang="en-GB" smtClean="0"/>
-              <a:t>25/07/2021</a:t>
+              <a:t>04/08/2021</a:t>
             </a:fld>
             <a:endParaRPr lang="en-GB"/>
           </a:p>
@@ -2394,7 +2461,7 @@
           <a:p>
             <a:fld id="{A7E68E60-9218-46BB-A378-9A469EA0EEDE}" type="datetimeFigureOut">
               <a:rPr lang="en-GB" smtClean="0"/>
-              <a:t>25/07/2021</a:t>
+              <a:t>04/08/2021</a:t>
             </a:fld>
             <a:endParaRPr lang="en-GB"/>
           </a:p>
@@ -2683,7 +2750,7 @@
           <a:p>
             <a:fld id="{A7E68E60-9218-46BB-A378-9A469EA0EEDE}" type="datetimeFigureOut">
               <a:rPr lang="en-GB" smtClean="0"/>
-              <a:t>25/07/2021</a:t>
+              <a:t>04/08/2021</a:t>
             </a:fld>
             <a:endParaRPr lang="en-GB"/>
           </a:p>
@@ -2926,7 +2993,7 @@
           <a:p>
             <a:fld id="{A7E68E60-9218-46BB-A378-9A469EA0EEDE}" type="datetimeFigureOut">
               <a:rPr lang="en-GB" smtClean="0"/>
-              <a:t>25/07/2021</a:t>
+              <a:t>04/08/2021</a:t>
             </a:fld>
             <a:endParaRPr lang="en-GB"/>
           </a:p>
@@ -5690,6 +5757,2705 @@
 </p:sld>
 </file>
 
+<file path=ppt/slides/slide3.xml><?xml version="1.0" encoding="utf-8"?>
+<p:sld xmlns:a="http://schemas.openxmlformats.org/drawingml/2006/main" xmlns:r="http://schemas.openxmlformats.org/officeDocument/2006/relationships" xmlns:p="http://schemas.openxmlformats.org/presentationml/2006/main">
+  <p:cSld>
+    <p:spTree>
+      <p:nvGrpSpPr>
+        <p:cNvPr id="1" name=""/>
+        <p:cNvGrpSpPr/>
+        <p:nvPr/>
+      </p:nvGrpSpPr>
+      <p:grpSpPr>
+        <a:xfrm>
+          <a:off x="0" y="0"/>
+          <a:ext cx="0" cy="0"/>
+          <a:chOff x="0" y="0"/>
+          <a:chExt cx="0" cy="0"/>
+        </a:xfrm>
+      </p:grpSpPr>
+      <mc:AlternateContent xmlns:mc="http://schemas.openxmlformats.org/markup-compatibility/2006">
+        <mc:Choice xmlns:a14="http://schemas.microsoft.com/office/drawing/2010/main" Requires="a14">
+          <p:graphicFrame>
+            <p:nvGraphicFramePr>
+              <p:cNvPr id="5" name="Table 4">
+                <a:extLst>
+                  <a:ext uri="{FF2B5EF4-FFF2-40B4-BE49-F238E27FC236}">
+                    <a16:creationId xmlns:a16="http://schemas.microsoft.com/office/drawing/2014/main" id="{DD7DCB67-FF56-41DA-A1D8-ECE9C2881C86}"/>
+                  </a:ext>
+                </a:extLst>
+              </p:cNvPr>
+              <p:cNvGraphicFramePr>
+                <a:graphicFrameLocks noGrp="1"/>
+              </p:cNvGraphicFramePr>
+              <p:nvPr>
+                <p:extLst>
+                  <p:ext uri="{D42A27DB-BD31-4B8C-83A1-F6EECF244321}">
+                    <p14:modId xmlns:p14="http://schemas.microsoft.com/office/powerpoint/2010/main" val="3096543741"/>
+                  </p:ext>
+                </p:extLst>
+              </p:nvPr>
+            </p:nvGraphicFramePr>
+            <p:xfrm>
+              <a:off x="4049234" y="82142"/>
+              <a:ext cx="6850993" cy="6693715"/>
+            </p:xfrm>
+            <a:graphic>
+              <a:graphicData uri="http://schemas.openxmlformats.org/drawingml/2006/table">
+                <a:tbl>
+                  <a:tblPr firstRow="1" bandRow="1">
+                    <a:tableStyleId>{3B4B98B0-60AC-42C2-AFA5-B58CD77FA1E5}</a:tableStyleId>
+                  </a:tblPr>
+                  <a:tblGrid>
+                    <a:gridCol w="608325">
+                      <a:extLst>
+                        <a:ext uri="{9D8B030D-6E8A-4147-A177-3AD203B41FA5}">
+                          <a16:colId xmlns:a16="http://schemas.microsoft.com/office/drawing/2014/main" val="1358090828"/>
+                        </a:ext>
+                      </a:extLst>
+                    </a:gridCol>
+                    <a:gridCol w="1973716">
+                      <a:extLst>
+                        <a:ext uri="{9D8B030D-6E8A-4147-A177-3AD203B41FA5}">
+                          <a16:colId xmlns:a16="http://schemas.microsoft.com/office/drawing/2014/main" val="3394853744"/>
+                        </a:ext>
+                      </a:extLst>
+                    </a:gridCol>
+                    <a:gridCol w="4268952">
+                      <a:extLst>
+                        <a:ext uri="{9D8B030D-6E8A-4147-A177-3AD203B41FA5}">
+                          <a16:colId xmlns:a16="http://schemas.microsoft.com/office/drawing/2014/main" val="2804598532"/>
+                        </a:ext>
+                      </a:extLst>
+                    </a:gridCol>
+                  </a:tblGrid>
+                  <a:tr h="526414">
+                    <a:tc>
+                      <a:txBody>
+                        <a:bodyPr/>
+                        <a:lstStyle/>
+                        <a:p>
+                          <a14:m>
+                            <m:oMathPara xmlns:m="http://schemas.openxmlformats.org/officeDocument/2006/math">
+                              <m:oMathParaPr>
+                                <m:jc m:val="centerGroup"/>
+                              </m:oMathParaPr>
+                              <m:oMath xmlns:m="http://schemas.openxmlformats.org/officeDocument/2006/math">
+                                <m:sSub>
+                                  <m:sSubPr>
+                                    <m:ctrlPr>
+                                      <a:rPr lang="en-PH" sz="1600" b="0" smtClean="0"/>
+                                    </m:ctrlPr>
+                                  </m:sSubPr>
+                                  <m:e>
+                                    <m:r>
+                                      <a:rPr lang="en-PH" sz="1600" b="0" smtClean="0"/>
+                                      <m:t>𝑋</m:t>
+                                    </m:r>
+                                  </m:e>
+                                  <m:sub>
+                                    <m:r>
+                                      <a:rPr lang="en-PH" sz="1600" b="0" smtClean="0"/>
+                                      <m:t>6</m:t>
+                                    </m:r>
+                                  </m:sub>
+                                </m:sSub>
+                              </m:oMath>
+                            </m:oMathPara>
+                          </a14:m>
+                          <a:endParaRPr lang="en-GB" sz="1400" b="0" dirty="0">
+                            <a:latin typeface="Arial" panose="020B0604020202020204" pitchFamily="34" charset="0"/>
+                            <a:cs typeface="Arial" panose="020B0604020202020204" pitchFamily="34" charset="0"/>
+                          </a:endParaRPr>
+                        </a:p>
+                      </a:txBody>
+                      <a:tcPr>
+                        <a:lnL w="12700" cap="flat" cmpd="sng" algn="ctr">
+                          <a:solidFill>
+                            <a:schemeClr val="tx1"/>
+                          </a:solidFill>
+                          <a:prstDash val="solid"/>
+                          <a:round/>
+                          <a:headEnd type="none" w="med" len="med"/>
+                          <a:tailEnd type="none" w="med" len="med"/>
+                        </a:lnL>
+                        <a:lnR>
+                          <a:noFill/>
+                        </a:lnR>
+                        <a:lnT w="12700" cap="flat" cmpd="sng" algn="ctr">
+                          <a:solidFill>
+                            <a:schemeClr val="tx1"/>
+                          </a:solidFill>
+                          <a:prstDash val="solid"/>
+                          <a:round/>
+                          <a:headEnd type="none" w="med" len="med"/>
+                          <a:tailEnd type="none" w="med" len="med"/>
+                        </a:lnT>
+                        <a:lnB w="12700" cmpd="sng">
+                          <a:noFill/>
+                        </a:lnB>
+                        <a:lnTlToBr w="12700" cmpd="sng">
+                          <a:noFill/>
+                          <a:prstDash val="solid"/>
+                        </a:lnTlToBr>
+                        <a:lnBlToTr w="12700" cmpd="sng">
+                          <a:noFill/>
+                          <a:prstDash val="solid"/>
+                        </a:lnBlToTr>
+                      </a:tcPr>
+                    </a:tc>
+                    <a:tc>
+                      <a:txBody>
+                        <a:bodyPr/>
+                        <a:lstStyle/>
+                        <a:p>
+                          <a:r>
+                            <a:rPr lang="en-PH" sz="1400" b="0" dirty="0"/>
+                            <a:t>Product quality</a:t>
+                          </a:r>
+                          <a:endParaRPr lang="en-GB" sz="1400" b="0" dirty="0">
+                            <a:latin typeface="Arial" panose="020B0604020202020204" pitchFamily="34" charset="0"/>
+                            <a:cs typeface="Arial" panose="020B0604020202020204" pitchFamily="34" charset="0"/>
+                          </a:endParaRPr>
+                        </a:p>
+                      </a:txBody>
+                      <a:tcPr>
+                        <a:lnL>
+                          <a:noFill/>
+                        </a:lnL>
+                        <a:lnR>
+                          <a:noFill/>
+                        </a:lnR>
+                        <a:lnT w="12700" cap="flat" cmpd="sng" algn="ctr">
+                          <a:solidFill>
+                            <a:schemeClr val="tx1"/>
+                          </a:solidFill>
+                          <a:prstDash val="solid"/>
+                          <a:round/>
+                          <a:headEnd type="none" w="med" len="med"/>
+                          <a:tailEnd type="none" w="med" len="med"/>
+                        </a:lnT>
+                        <a:lnB w="12700" cmpd="sng">
+                          <a:noFill/>
+                        </a:lnB>
+                        <a:lnTlToBr w="12700" cmpd="sng">
+                          <a:noFill/>
+                          <a:prstDash val="solid"/>
+                        </a:lnTlToBr>
+                        <a:lnBlToTr w="12700" cmpd="sng">
+                          <a:noFill/>
+                          <a:prstDash val="solid"/>
+                        </a:lnBlToTr>
+                      </a:tcPr>
+                    </a:tc>
+                    <a:tc>
+                      <a:txBody>
+                        <a:bodyPr/>
+                        <a:lstStyle/>
+                        <a:p>
+                          <a:r>
+                            <a:rPr lang="en-PH" sz="1400" b="0" dirty="0"/>
+                            <a:t>Perceived level of quality of HBAT’s paper products</a:t>
+                          </a:r>
+                          <a:endParaRPr lang="en-GB" sz="1400" b="0" dirty="0">
+                            <a:latin typeface="Arial" panose="020B0604020202020204" pitchFamily="34" charset="0"/>
+                            <a:cs typeface="Arial" panose="020B0604020202020204" pitchFamily="34" charset="0"/>
+                          </a:endParaRPr>
+                        </a:p>
+                      </a:txBody>
+                      <a:tcPr>
+                        <a:lnL>
+                          <a:noFill/>
+                        </a:lnL>
+                        <a:lnR w="12700" cap="flat" cmpd="sng" algn="ctr">
+                          <a:solidFill>
+                            <a:schemeClr val="tx1"/>
+                          </a:solidFill>
+                          <a:prstDash val="solid"/>
+                          <a:round/>
+                          <a:headEnd type="none" w="med" len="med"/>
+                          <a:tailEnd type="none" w="med" len="med"/>
+                        </a:lnR>
+                        <a:lnT w="12700" cap="flat" cmpd="sng" algn="ctr">
+                          <a:solidFill>
+                            <a:schemeClr val="tx1"/>
+                          </a:solidFill>
+                          <a:prstDash val="solid"/>
+                          <a:round/>
+                          <a:headEnd type="none" w="med" len="med"/>
+                          <a:tailEnd type="none" w="med" len="med"/>
+                        </a:lnT>
+                        <a:lnB w="12700" cmpd="sng">
+                          <a:noFill/>
+                        </a:lnB>
+                        <a:lnTlToBr w="12700" cmpd="sng">
+                          <a:noFill/>
+                          <a:prstDash val="solid"/>
+                        </a:lnTlToBr>
+                        <a:lnBlToTr w="12700" cmpd="sng">
+                          <a:noFill/>
+                          <a:prstDash val="solid"/>
+                        </a:lnBlToTr>
+                      </a:tcPr>
+                    </a:tc>
+                    <a:extLst>
+                      <a:ext uri="{0D108BD9-81ED-4DB2-BD59-A6C34878D82A}">
+                        <a16:rowId xmlns:a16="http://schemas.microsoft.com/office/drawing/2014/main" val="168199111"/>
+                      </a:ext>
+                    </a:extLst>
+                  </a:tr>
+                  <a:tr h="376747">
+                    <a:tc>
+                      <a:txBody>
+                        <a:bodyPr/>
+                        <a:lstStyle/>
+                        <a:p>
+                          <a14:m>
+                            <m:oMathPara xmlns:m="http://schemas.openxmlformats.org/officeDocument/2006/math">
+                              <m:oMathParaPr>
+                                <m:jc m:val="centerGroup"/>
+                              </m:oMathParaPr>
+                              <m:oMath xmlns:m="http://schemas.openxmlformats.org/officeDocument/2006/math">
+                                <m:sSub>
+                                  <m:sSubPr>
+                                    <m:ctrlPr>
+                                      <a:rPr lang="en-PH" sz="1400" b="0" smtClean="0"/>
+                                    </m:ctrlPr>
+                                  </m:sSubPr>
+                                  <m:e>
+                                    <m:r>
+                                      <a:rPr lang="en-PH" sz="1400" b="0" smtClean="0"/>
+                                      <m:t>𝑋</m:t>
+                                    </m:r>
+                                  </m:e>
+                                  <m:sub>
+                                    <m:r>
+                                      <a:rPr lang="en-PH" sz="1400" b="0" smtClean="0"/>
+                                      <m:t>7</m:t>
+                                    </m:r>
+                                  </m:sub>
+                                </m:sSub>
+                              </m:oMath>
+                            </m:oMathPara>
+                          </a14:m>
+                          <a:endParaRPr lang="en-GB" sz="1400" b="0" dirty="0">
+                            <a:latin typeface="Arial" panose="020B0604020202020204" pitchFamily="34" charset="0"/>
+                            <a:cs typeface="Arial" panose="020B0604020202020204" pitchFamily="34" charset="0"/>
+                          </a:endParaRPr>
+                        </a:p>
+                      </a:txBody>
+                      <a:tcPr>
+                        <a:lnL w="12700" cap="flat" cmpd="sng" algn="ctr">
+                          <a:solidFill>
+                            <a:schemeClr val="tx1"/>
+                          </a:solidFill>
+                          <a:prstDash val="solid"/>
+                          <a:round/>
+                          <a:headEnd type="none" w="med" len="med"/>
+                          <a:tailEnd type="none" w="med" len="med"/>
+                        </a:lnL>
+                        <a:lnT w="12700" cmpd="sng">
+                          <a:noFill/>
+                        </a:lnT>
+                      </a:tcPr>
+                    </a:tc>
+                    <a:tc>
+                      <a:txBody>
+                        <a:bodyPr/>
+                        <a:lstStyle/>
+                        <a:p>
+                          <a:r>
+                            <a:rPr lang="en-PH" sz="1400" b="0" dirty="0"/>
+                            <a:t>E-commerce</a:t>
+                          </a:r>
+                          <a:endParaRPr lang="en-GB" sz="1400" b="0" dirty="0">
+                            <a:latin typeface="Arial" panose="020B0604020202020204" pitchFamily="34" charset="0"/>
+                            <a:cs typeface="Arial" panose="020B0604020202020204" pitchFamily="34" charset="0"/>
+                          </a:endParaRPr>
+                        </a:p>
+                      </a:txBody>
+                      <a:tcPr>
+                        <a:lnT w="12700" cmpd="sng">
+                          <a:noFill/>
+                        </a:lnT>
+                      </a:tcPr>
+                    </a:tc>
+                    <a:tc>
+                      <a:txBody>
+                        <a:bodyPr/>
+                        <a:lstStyle/>
+                        <a:p>
+                          <a:r>
+                            <a:rPr lang="en-PH" sz="1400" b="0" dirty="0"/>
+                            <a:t>Overall image of HBAT’s website; user-friendliness</a:t>
+                          </a:r>
+                          <a:endParaRPr lang="en-GB" sz="1400" b="0" dirty="0">
+                            <a:latin typeface="Arial" panose="020B0604020202020204" pitchFamily="34" charset="0"/>
+                            <a:cs typeface="Arial" panose="020B0604020202020204" pitchFamily="34" charset="0"/>
+                          </a:endParaRPr>
+                        </a:p>
+                      </a:txBody>
+                      <a:tcPr>
+                        <a:lnR w="12700" cap="flat" cmpd="sng" algn="ctr">
+                          <a:solidFill>
+                            <a:schemeClr val="tx1"/>
+                          </a:solidFill>
+                          <a:prstDash val="solid"/>
+                          <a:round/>
+                          <a:headEnd type="none" w="med" len="med"/>
+                          <a:tailEnd type="none" w="med" len="med"/>
+                        </a:lnR>
+                        <a:lnT w="12700" cmpd="sng">
+                          <a:noFill/>
+                        </a:lnT>
+                      </a:tcPr>
+                    </a:tc>
+                    <a:extLst>
+                      <a:ext uri="{0D108BD9-81ED-4DB2-BD59-A6C34878D82A}">
+                        <a16:rowId xmlns:a16="http://schemas.microsoft.com/office/drawing/2014/main" val="3695046256"/>
+                      </a:ext>
+                    </a:extLst>
+                  </a:tr>
+                  <a:tr h="526414">
+                    <a:tc>
+                      <a:txBody>
+                        <a:bodyPr/>
+                        <a:lstStyle/>
+                        <a:p>
+                          <a14:m>
+                            <m:oMathPara xmlns:m="http://schemas.openxmlformats.org/officeDocument/2006/math">
+                              <m:oMathParaPr>
+                                <m:jc m:val="centerGroup"/>
+                              </m:oMathParaPr>
+                              <m:oMath xmlns:m="http://schemas.openxmlformats.org/officeDocument/2006/math">
+                                <m:sSub>
+                                  <m:sSubPr>
+                                    <m:ctrlPr>
+                                      <a:rPr lang="en-PH" sz="1400" b="0" smtClean="0"/>
+                                    </m:ctrlPr>
+                                  </m:sSubPr>
+                                  <m:e>
+                                    <m:r>
+                                      <a:rPr lang="en-PH" sz="1400" b="0" smtClean="0"/>
+                                      <m:t>𝑋</m:t>
+                                    </m:r>
+                                  </m:e>
+                                  <m:sub>
+                                    <m:r>
+                                      <a:rPr lang="en-PH" sz="1400" b="0" smtClean="0"/>
+                                      <m:t>8</m:t>
+                                    </m:r>
+                                  </m:sub>
+                                </m:sSub>
+                              </m:oMath>
+                            </m:oMathPara>
+                          </a14:m>
+                          <a:endParaRPr lang="en-GB" sz="1400" b="0" dirty="0">
+                            <a:latin typeface="Arial" panose="020B0604020202020204" pitchFamily="34" charset="0"/>
+                            <a:cs typeface="Arial" panose="020B0604020202020204" pitchFamily="34" charset="0"/>
+                          </a:endParaRPr>
+                        </a:p>
+                      </a:txBody>
+                      <a:tcPr>
+                        <a:lnL w="12700" cap="flat" cmpd="sng" algn="ctr">
+                          <a:solidFill>
+                            <a:schemeClr val="tx1"/>
+                          </a:solidFill>
+                          <a:prstDash val="solid"/>
+                          <a:round/>
+                          <a:headEnd type="none" w="med" len="med"/>
+                          <a:tailEnd type="none" w="med" len="med"/>
+                        </a:lnL>
+                      </a:tcPr>
+                    </a:tc>
+                    <a:tc>
+                      <a:txBody>
+                        <a:bodyPr/>
+                        <a:lstStyle/>
+                        <a:p>
+                          <a:r>
+                            <a:rPr lang="en-PH" sz="1400" b="0" dirty="0"/>
+                            <a:t>Technical support</a:t>
+                          </a:r>
+                          <a:endParaRPr lang="en-GB" sz="1400" b="0" dirty="0">
+                            <a:latin typeface="Arial" panose="020B0604020202020204" pitchFamily="34" charset="0"/>
+                            <a:cs typeface="Arial" panose="020B0604020202020204" pitchFamily="34" charset="0"/>
+                          </a:endParaRPr>
+                        </a:p>
+                      </a:txBody>
+                      <a:tcPr/>
+                    </a:tc>
+                    <a:tc>
+                      <a:txBody>
+                        <a:bodyPr/>
+                        <a:lstStyle/>
+                        <a:p>
+                          <a:r>
+                            <a:rPr lang="en-PH" sz="1400" b="0" dirty="0"/>
+                            <a:t>Extent to which technical support is offered</a:t>
+                          </a:r>
+                          <a:endParaRPr lang="en-GB" sz="1400" b="0" dirty="0">
+                            <a:latin typeface="Arial" panose="020B0604020202020204" pitchFamily="34" charset="0"/>
+                            <a:cs typeface="Arial" panose="020B0604020202020204" pitchFamily="34" charset="0"/>
+                          </a:endParaRPr>
+                        </a:p>
+                      </a:txBody>
+                      <a:tcPr>
+                        <a:lnR w="12700" cap="flat" cmpd="sng" algn="ctr">
+                          <a:solidFill>
+                            <a:schemeClr val="tx1"/>
+                          </a:solidFill>
+                          <a:prstDash val="solid"/>
+                          <a:round/>
+                          <a:headEnd type="none" w="med" len="med"/>
+                          <a:tailEnd type="none" w="med" len="med"/>
+                        </a:lnR>
+                      </a:tcPr>
+                    </a:tc>
+                    <a:extLst>
+                      <a:ext uri="{0D108BD9-81ED-4DB2-BD59-A6C34878D82A}">
+                        <a16:rowId xmlns:a16="http://schemas.microsoft.com/office/drawing/2014/main" val="2372983334"/>
+                      </a:ext>
+                    </a:extLst>
+                  </a:tr>
+                  <a:tr h="526414">
+                    <a:tc>
+                      <a:txBody>
+                        <a:bodyPr/>
+                        <a:lstStyle/>
+                        <a:p>
+                          <a14:m>
+                            <m:oMathPara xmlns:m="http://schemas.openxmlformats.org/officeDocument/2006/math">
+                              <m:oMathParaPr>
+                                <m:jc m:val="centerGroup"/>
+                              </m:oMathParaPr>
+                              <m:oMath xmlns:m="http://schemas.openxmlformats.org/officeDocument/2006/math">
+                                <m:sSub>
+                                  <m:sSubPr>
+                                    <m:ctrlPr>
+                                      <a:rPr lang="en-PH" sz="1400" b="0" smtClean="0"/>
+                                    </m:ctrlPr>
+                                  </m:sSubPr>
+                                  <m:e>
+                                    <m:r>
+                                      <a:rPr lang="en-PH" sz="1400" b="0" smtClean="0"/>
+                                      <m:t>𝑋</m:t>
+                                    </m:r>
+                                  </m:e>
+                                  <m:sub>
+                                    <m:r>
+                                      <a:rPr lang="en-PH" sz="1400" b="0" smtClean="0"/>
+                                      <m:t>9</m:t>
+                                    </m:r>
+                                  </m:sub>
+                                </m:sSub>
+                              </m:oMath>
+                            </m:oMathPara>
+                          </a14:m>
+                          <a:endParaRPr lang="en-GB" sz="1400" b="0" dirty="0">
+                            <a:latin typeface="Arial" panose="020B0604020202020204" pitchFamily="34" charset="0"/>
+                            <a:cs typeface="Arial" panose="020B0604020202020204" pitchFamily="34" charset="0"/>
+                          </a:endParaRPr>
+                        </a:p>
+                      </a:txBody>
+                      <a:tcPr>
+                        <a:lnL w="12700" cap="flat" cmpd="sng" algn="ctr">
+                          <a:solidFill>
+                            <a:schemeClr val="tx1"/>
+                          </a:solidFill>
+                          <a:prstDash val="solid"/>
+                          <a:round/>
+                          <a:headEnd type="none" w="med" len="med"/>
+                          <a:tailEnd type="none" w="med" len="med"/>
+                        </a:lnL>
+                      </a:tcPr>
+                    </a:tc>
+                    <a:tc>
+                      <a:txBody>
+                        <a:bodyPr/>
+                        <a:lstStyle/>
+                        <a:p>
+                          <a:r>
+                            <a:rPr lang="en-PH" sz="1400" b="0" dirty="0"/>
+                            <a:t>Complaint resolution</a:t>
+                          </a:r>
+                          <a:endParaRPr lang="en-GB" sz="1400" b="0" dirty="0">
+                            <a:latin typeface="Arial" panose="020B0604020202020204" pitchFamily="34" charset="0"/>
+                            <a:cs typeface="Arial" panose="020B0604020202020204" pitchFamily="34" charset="0"/>
+                          </a:endParaRPr>
+                        </a:p>
+                      </a:txBody>
+                      <a:tcPr/>
+                    </a:tc>
+                    <a:tc>
+                      <a:txBody>
+                        <a:bodyPr/>
+                        <a:lstStyle/>
+                        <a:p>
+                          <a:r>
+                            <a:rPr lang="en-PH" sz="1400" b="0" dirty="0"/>
+                            <a:t>Extent to which any complaints are resolved in timely and complete manner</a:t>
+                          </a:r>
+                          <a:endParaRPr lang="en-GB" sz="1400" b="0" dirty="0">
+                            <a:latin typeface="Arial" panose="020B0604020202020204" pitchFamily="34" charset="0"/>
+                            <a:cs typeface="Arial" panose="020B0604020202020204" pitchFamily="34" charset="0"/>
+                          </a:endParaRPr>
+                        </a:p>
+                      </a:txBody>
+                      <a:tcPr>
+                        <a:lnR w="12700" cap="flat" cmpd="sng" algn="ctr">
+                          <a:solidFill>
+                            <a:schemeClr val="tx1"/>
+                          </a:solidFill>
+                          <a:prstDash val="solid"/>
+                          <a:round/>
+                          <a:headEnd type="none" w="med" len="med"/>
+                          <a:tailEnd type="none" w="med" len="med"/>
+                        </a:lnR>
+                      </a:tcPr>
+                    </a:tc>
+                    <a:extLst>
+                      <a:ext uri="{0D108BD9-81ED-4DB2-BD59-A6C34878D82A}">
+                        <a16:rowId xmlns:a16="http://schemas.microsoft.com/office/drawing/2014/main" val="2216671192"/>
+                      </a:ext>
+                    </a:extLst>
+                  </a:tr>
+                  <a:tr h="526414">
+                    <a:tc>
+                      <a:txBody>
+                        <a:bodyPr/>
+                        <a:lstStyle/>
+                        <a:p>
+                          <a14:m>
+                            <m:oMathPara xmlns:m="http://schemas.openxmlformats.org/officeDocument/2006/math">
+                              <m:oMathParaPr>
+                                <m:jc m:val="centerGroup"/>
+                              </m:oMathParaPr>
+                              <m:oMath xmlns:m="http://schemas.openxmlformats.org/officeDocument/2006/math">
+                                <m:sSub>
+                                  <m:sSubPr>
+                                    <m:ctrlPr>
+                                      <a:rPr lang="en-PH" sz="1400" b="0" smtClean="0"/>
+                                    </m:ctrlPr>
+                                  </m:sSubPr>
+                                  <m:e>
+                                    <m:r>
+                                      <a:rPr lang="en-PH" sz="1400" b="0" smtClean="0"/>
+                                      <m:t>𝑋</m:t>
+                                    </m:r>
+                                  </m:e>
+                                  <m:sub>
+                                    <m:r>
+                                      <a:rPr lang="en-PH" sz="1400" b="0" smtClean="0"/>
+                                      <m:t>10</m:t>
+                                    </m:r>
+                                  </m:sub>
+                                </m:sSub>
+                              </m:oMath>
+                            </m:oMathPara>
+                          </a14:m>
+                          <a:endParaRPr lang="en-GB" sz="1400" b="0" dirty="0">
+                            <a:latin typeface="Arial" panose="020B0604020202020204" pitchFamily="34" charset="0"/>
+                            <a:cs typeface="Arial" panose="020B0604020202020204" pitchFamily="34" charset="0"/>
+                          </a:endParaRPr>
+                        </a:p>
+                      </a:txBody>
+                      <a:tcPr>
+                        <a:lnL w="12700" cap="flat" cmpd="sng" algn="ctr">
+                          <a:solidFill>
+                            <a:schemeClr val="tx1"/>
+                          </a:solidFill>
+                          <a:prstDash val="solid"/>
+                          <a:round/>
+                          <a:headEnd type="none" w="med" len="med"/>
+                          <a:tailEnd type="none" w="med" len="med"/>
+                        </a:lnL>
+                      </a:tcPr>
+                    </a:tc>
+                    <a:tc>
+                      <a:txBody>
+                        <a:bodyPr/>
+                        <a:lstStyle/>
+                        <a:p>
+                          <a:r>
+                            <a:rPr lang="en-PH" sz="1400" b="0" dirty="0"/>
+                            <a:t>Advertising</a:t>
+                          </a:r>
+                          <a:endParaRPr lang="en-GB" sz="1400" b="0" dirty="0">
+                            <a:latin typeface="Arial" panose="020B0604020202020204" pitchFamily="34" charset="0"/>
+                            <a:cs typeface="Arial" panose="020B0604020202020204" pitchFamily="34" charset="0"/>
+                          </a:endParaRPr>
+                        </a:p>
+                      </a:txBody>
+                      <a:tcPr/>
+                    </a:tc>
+                    <a:tc>
+                      <a:txBody>
+                        <a:bodyPr/>
+                        <a:lstStyle/>
+                        <a:p>
+                          <a:r>
+                            <a:rPr lang="en-PH" sz="1400" b="0" dirty="0"/>
+                            <a:t>Perceptions of HBAT’s product line to meet customer needs</a:t>
+                          </a:r>
+                          <a:endParaRPr lang="en-GB" sz="1400" b="0" dirty="0">
+                            <a:latin typeface="Arial" panose="020B0604020202020204" pitchFamily="34" charset="0"/>
+                            <a:cs typeface="Arial" panose="020B0604020202020204" pitchFamily="34" charset="0"/>
+                          </a:endParaRPr>
+                        </a:p>
+                      </a:txBody>
+                      <a:tcPr>
+                        <a:lnR w="12700" cap="flat" cmpd="sng" algn="ctr">
+                          <a:solidFill>
+                            <a:schemeClr val="tx1"/>
+                          </a:solidFill>
+                          <a:prstDash val="solid"/>
+                          <a:round/>
+                          <a:headEnd type="none" w="med" len="med"/>
+                          <a:tailEnd type="none" w="med" len="med"/>
+                        </a:lnR>
+                      </a:tcPr>
+                    </a:tc>
+                    <a:extLst>
+                      <a:ext uri="{0D108BD9-81ED-4DB2-BD59-A6C34878D82A}">
+                        <a16:rowId xmlns:a16="http://schemas.microsoft.com/office/drawing/2014/main" val="3692207160"/>
+                      </a:ext>
+                    </a:extLst>
+                  </a:tr>
+                  <a:tr h="526414">
+                    <a:tc>
+                      <a:txBody>
+                        <a:bodyPr/>
+                        <a:lstStyle/>
+                        <a:p>
+                          <a14:m>
+                            <m:oMathPara xmlns:m="http://schemas.openxmlformats.org/officeDocument/2006/math">
+                              <m:oMathParaPr>
+                                <m:jc m:val="centerGroup"/>
+                              </m:oMathParaPr>
+                              <m:oMath xmlns:m="http://schemas.openxmlformats.org/officeDocument/2006/math">
+                                <m:sSub>
+                                  <m:sSubPr>
+                                    <m:ctrlPr>
+                                      <a:rPr lang="en-PH" sz="1400" b="0" smtClean="0"/>
+                                    </m:ctrlPr>
+                                  </m:sSubPr>
+                                  <m:e>
+                                    <m:r>
+                                      <a:rPr lang="en-PH" sz="1400" b="0" smtClean="0"/>
+                                      <m:t>𝑋</m:t>
+                                    </m:r>
+                                  </m:e>
+                                  <m:sub>
+                                    <m:r>
+                                      <a:rPr lang="en-PH" sz="1400" b="0" smtClean="0"/>
+                                      <m:t>11</m:t>
+                                    </m:r>
+                                  </m:sub>
+                                </m:sSub>
+                              </m:oMath>
+                            </m:oMathPara>
+                          </a14:m>
+                          <a:endParaRPr lang="en-GB" sz="1400" b="0" dirty="0">
+                            <a:latin typeface="Arial" panose="020B0604020202020204" pitchFamily="34" charset="0"/>
+                            <a:cs typeface="Arial" panose="020B0604020202020204" pitchFamily="34" charset="0"/>
+                          </a:endParaRPr>
+                        </a:p>
+                      </a:txBody>
+                      <a:tcPr>
+                        <a:lnL w="12700" cap="flat" cmpd="sng" algn="ctr">
+                          <a:solidFill>
+                            <a:schemeClr val="tx1"/>
+                          </a:solidFill>
+                          <a:prstDash val="solid"/>
+                          <a:round/>
+                          <a:headEnd type="none" w="med" len="med"/>
+                          <a:tailEnd type="none" w="med" len="med"/>
+                        </a:lnL>
+                      </a:tcPr>
+                    </a:tc>
+                    <a:tc>
+                      <a:txBody>
+                        <a:bodyPr/>
+                        <a:lstStyle/>
+                        <a:p>
+                          <a:r>
+                            <a:rPr lang="en-PH" sz="1400" b="0" dirty="0"/>
+                            <a:t>Product line</a:t>
+                          </a:r>
+                          <a:endParaRPr lang="en-GB" sz="1400" b="0" dirty="0">
+                            <a:latin typeface="Arial" panose="020B0604020202020204" pitchFamily="34" charset="0"/>
+                            <a:cs typeface="Arial" panose="020B0604020202020204" pitchFamily="34" charset="0"/>
+                          </a:endParaRPr>
+                        </a:p>
+                      </a:txBody>
+                      <a:tcPr/>
+                    </a:tc>
+                    <a:tc>
+                      <a:txBody>
+                        <a:bodyPr/>
+                        <a:lstStyle/>
+                        <a:p>
+                          <a:r>
+                            <a:rPr lang="en-PH" sz="1400" b="0" dirty="0"/>
+                            <a:t>Depth and breadth of HBAT’s product line to meet customer needs</a:t>
+                          </a:r>
+                          <a:endParaRPr lang="en-GB" sz="1400" b="0" dirty="0">
+                            <a:latin typeface="Arial" panose="020B0604020202020204" pitchFamily="34" charset="0"/>
+                            <a:cs typeface="Arial" panose="020B0604020202020204" pitchFamily="34" charset="0"/>
+                          </a:endParaRPr>
+                        </a:p>
+                      </a:txBody>
+                      <a:tcPr>
+                        <a:lnR w="12700" cap="flat" cmpd="sng" algn="ctr">
+                          <a:solidFill>
+                            <a:schemeClr val="tx1"/>
+                          </a:solidFill>
+                          <a:prstDash val="solid"/>
+                          <a:round/>
+                          <a:headEnd type="none" w="med" len="med"/>
+                          <a:tailEnd type="none" w="med" len="med"/>
+                        </a:lnR>
+                      </a:tcPr>
+                    </a:tc>
+                    <a:extLst>
+                      <a:ext uri="{0D108BD9-81ED-4DB2-BD59-A6C34878D82A}">
+                        <a16:rowId xmlns:a16="http://schemas.microsoft.com/office/drawing/2014/main" val="83474327"/>
+                      </a:ext>
+                    </a:extLst>
+                  </a:tr>
+                  <a:tr h="526414">
+                    <a:tc>
+                      <a:txBody>
+                        <a:bodyPr/>
+                        <a:lstStyle/>
+                        <a:p>
+                          <a14:m>
+                            <m:oMathPara xmlns:m="http://schemas.openxmlformats.org/officeDocument/2006/math">
+                              <m:oMathParaPr>
+                                <m:jc m:val="centerGroup"/>
+                              </m:oMathParaPr>
+                              <m:oMath xmlns:m="http://schemas.openxmlformats.org/officeDocument/2006/math">
+                                <m:sSub>
+                                  <m:sSubPr>
+                                    <m:ctrlPr>
+                                      <a:rPr lang="en-PH" sz="1400" b="0" smtClean="0"/>
+                                    </m:ctrlPr>
+                                  </m:sSubPr>
+                                  <m:e>
+                                    <m:r>
+                                      <a:rPr lang="en-PH" sz="1400" b="0" smtClean="0"/>
+                                      <m:t>𝑋</m:t>
+                                    </m:r>
+                                  </m:e>
+                                  <m:sub>
+                                    <m:r>
+                                      <a:rPr lang="en-PH" sz="1400" b="0" smtClean="0"/>
+                                      <m:t>12</m:t>
+                                    </m:r>
+                                  </m:sub>
+                                </m:sSub>
+                              </m:oMath>
+                            </m:oMathPara>
+                          </a14:m>
+                          <a:endParaRPr lang="en-GB" sz="1400" b="0" dirty="0">
+                            <a:latin typeface="Arial" panose="020B0604020202020204" pitchFamily="34" charset="0"/>
+                            <a:cs typeface="Arial" panose="020B0604020202020204" pitchFamily="34" charset="0"/>
+                          </a:endParaRPr>
+                        </a:p>
+                      </a:txBody>
+                      <a:tcPr>
+                        <a:lnL w="12700" cap="flat" cmpd="sng" algn="ctr">
+                          <a:solidFill>
+                            <a:schemeClr val="tx1"/>
+                          </a:solidFill>
+                          <a:prstDash val="solid"/>
+                          <a:round/>
+                          <a:headEnd type="none" w="med" len="med"/>
+                          <a:tailEnd type="none" w="med" len="med"/>
+                        </a:lnL>
+                      </a:tcPr>
+                    </a:tc>
+                    <a:tc>
+                      <a:txBody>
+                        <a:bodyPr/>
+                        <a:lstStyle/>
+                        <a:p>
+                          <a:r>
+                            <a:rPr lang="en-PH" sz="1400" b="0" dirty="0"/>
+                            <a:t>Salesforce image</a:t>
+                          </a:r>
+                          <a:endParaRPr lang="en-GB" sz="1400" b="0" dirty="0">
+                            <a:latin typeface="Arial" panose="020B0604020202020204" pitchFamily="34" charset="0"/>
+                            <a:cs typeface="Arial" panose="020B0604020202020204" pitchFamily="34" charset="0"/>
+                          </a:endParaRPr>
+                        </a:p>
+                      </a:txBody>
+                      <a:tcPr/>
+                    </a:tc>
+                    <a:tc>
+                      <a:txBody>
+                        <a:bodyPr/>
+                        <a:lstStyle/>
+                        <a:p>
+                          <a:r>
+                            <a:rPr lang="en-PH" sz="1400" b="0" dirty="0"/>
+                            <a:t>Overall image of HBAT’s salesforce</a:t>
+                          </a:r>
+                          <a:endParaRPr lang="en-GB" sz="1400" b="0" dirty="0">
+                            <a:latin typeface="Arial" panose="020B0604020202020204" pitchFamily="34" charset="0"/>
+                            <a:cs typeface="Arial" panose="020B0604020202020204" pitchFamily="34" charset="0"/>
+                          </a:endParaRPr>
+                        </a:p>
+                      </a:txBody>
+                      <a:tcPr>
+                        <a:lnR w="12700" cap="flat" cmpd="sng" algn="ctr">
+                          <a:solidFill>
+                            <a:schemeClr val="tx1"/>
+                          </a:solidFill>
+                          <a:prstDash val="solid"/>
+                          <a:round/>
+                          <a:headEnd type="none" w="med" len="med"/>
+                          <a:tailEnd type="none" w="med" len="med"/>
+                        </a:lnR>
+                      </a:tcPr>
+                    </a:tc>
+                    <a:extLst>
+                      <a:ext uri="{0D108BD9-81ED-4DB2-BD59-A6C34878D82A}">
+                        <a16:rowId xmlns:a16="http://schemas.microsoft.com/office/drawing/2014/main" val="2725664331"/>
+                      </a:ext>
+                    </a:extLst>
+                  </a:tr>
+                  <a:tr h="526414">
+                    <a:tc>
+                      <a:txBody>
+                        <a:bodyPr/>
+                        <a:lstStyle/>
+                        <a:p>
+                          <a14:m>
+                            <m:oMathPara xmlns:m="http://schemas.openxmlformats.org/officeDocument/2006/math">
+                              <m:oMathParaPr>
+                                <m:jc m:val="centerGroup"/>
+                              </m:oMathParaPr>
+                              <m:oMath xmlns:m="http://schemas.openxmlformats.org/officeDocument/2006/math">
+                                <m:sSub>
+                                  <m:sSubPr>
+                                    <m:ctrlPr>
+                                      <a:rPr lang="en-PH" sz="1400" b="0" smtClean="0"/>
+                                    </m:ctrlPr>
+                                  </m:sSubPr>
+                                  <m:e>
+                                    <m:r>
+                                      <a:rPr lang="en-PH" sz="1400" b="0" smtClean="0"/>
+                                      <m:t>𝑋</m:t>
+                                    </m:r>
+                                  </m:e>
+                                  <m:sub>
+                                    <m:r>
+                                      <a:rPr lang="en-PH" sz="1400" b="0" smtClean="0"/>
+                                      <m:t>13</m:t>
+                                    </m:r>
+                                  </m:sub>
+                                </m:sSub>
+                              </m:oMath>
+                            </m:oMathPara>
+                          </a14:m>
+                          <a:endParaRPr lang="en-GB" sz="1400" b="0" dirty="0">
+                            <a:latin typeface="Arial" panose="020B0604020202020204" pitchFamily="34" charset="0"/>
+                            <a:cs typeface="Arial" panose="020B0604020202020204" pitchFamily="34" charset="0"/>
+                          </a:endParaRPr>
+                        </a:p>
+                      </a:txBody>
+                      <a:tcPr>
+                        <a:lnL w="12700" cap="flat" cmpd="sng" algn="ctr">
+                          <a:solidFill>
+                            <a:schemeClr val="tx1"/>
+                          </a:solidFill>
+                          <a:prstDash val="solid"/>
+                          <a:round/>
+                          <a:headEnd type="none" w="med" len="med"/>
+                          <a:tailEnd type="none" w="med" len="med"/>
+                        </a:lnL>
+                      </a:tcPr>
+                    </a:tc>
+                    <a:tc>
+                      <a:txBody>
+                        <a:bodyPr/>
+                        <a:lstStyle/>
+                        <a:p>
+                          <a:r>
+                            <a:rPr lang="en-PH" sz="1400" b="0" dirty="0"/>
+                            <a:t>Competitive pricing</a:t>
+                          </a:r>
+                          <a:endParaRPr lang="en-GB" sz="1400" b="0" dirty="0">
+                            <a:latin typeface="Arial" panose="020B0604020202020204" pitchFamily="34" charset="0"/>
+                            <a:cs typeface="Arial" panose="020B0604020202020204" pitchFamily="34" charset="0"/>
+                          </a:endParaRPr>
+                        </a:p>
+                      </a:txBody>
+                      <a:tcPr/>
+                    </a:tc>
+                    <a:tc>
+                      <a:txBody>
+                        <a:bodyPr/>
+                        <a:lstStyle/>
+                        <a:p>
+                          <a:r>
+                            <a:rPr lang="en-PH" sz="1400" b="0" dirty="0"/>
+                            <a:t>Extent to which HBAT offers competitive prices</a:t>
+                          </a:r>
+                          <a:endParaRPr lang="en-GB" sz="1400" b="0" dirty="0">
+                            <a:latin typeface="Arial" panose="020B0604020202020204" pitchFamily="34" charset="0"/>
+                            <a:cs typeface="Arial" panose="020B0604020202020204" pitchFamily="34" charset="0"/>
+                          </a:endParaRPr>
+                        </a:p>
+                      </a:txBody>
+                      <a:tcPr>
+                        <a:lnR w="12700" cap="flat" cmpd="sng" algn="ctr">
+                          <a:solidFill>
+                            <a:schemeClr val="tx1"/>
+                          </a:solidFill>
+                          <a:prstDash val="solid"/>
+                          <a:round/>
+                          <a:headEnd type="none" w="med" len="med"/>
+                          <a:tailEnd type="none" w="med" len="med"/>
+                        </a:lnR>
+                      </a:tcPr>
+                    </a:tc>
+                    <a:extLst>
+                      <a:ext uri="{0D108BD9-81ED-4DB2-BD59-A6C34878D82A}">
+                        <a16:rowId xmlns:a16="http://schemas.microsoft.com/office/drawing/2014/main" val="1713181456"/>
+                      </a:ext>
+                    </a:extLst>
+                  </a:tr>
+                  <a:tr h="526414">
+                    <a:tc>
+                      <a:txBody>
+                        <a:bodyPr/>
+                        <a:lstStyle/>
+                        <a:p>
+                          <a14:m>
+                            <m:oMathPara xmlns:m="http://schemas.openxmlformats.org/officeDocument/2006/math">
+                              <m:oMathParaPr>
+                                <m:jc m:val="centerGroup"/>
+                              </m:oMathParaPr>
+                              <m:oMath xmlns:m="http://schemas.openxmlformats.org/officeDocument/2006/math">
+                                <m:sSub>
+                                  <m:sSubPr>
+                                    <m:ctrlPr>
+                                      <a:rPr lang="en-PH" sz="1400" b="0" smtClean="0"/>
+                                    </m:ctrlPr>
+                                  </m:sSubPr>
+                                  <m:e>
+                                    <m:r>
+                                      <a:rPr lang="en-PH" sz="1400" b="0" smtClean="0"/>
+                                      <m:t>𝑋</m:t>
+                                    </m:r>
+                                  </m:e>
+                                  <m:sub>
+                                    <m:r>
+                                      <a:rPr lang="en-PH" sz="1400" b="0" smtClean="0"/>
+                                      <m:t>14</m:t>
+                                    </m:r>
+                                  </m:sub>
+                                </m:sSub>
+                              </m:oMath>
+                            </m:oMathPara>
+                          </a14:m>
+                          <a:endParaRPr lang="en-GB" sz="1400" b="0" dirty="0">
+                            <a:latin typeface="Arial" panose="020B0604020202020204" pitchFamily="34" charset="0"/>
+                            <a:cs typeface="Arial" panose="020B0604020202020204" pitchFamily="34" charset="0"/>
+                          </a:endParaRPr>
+                        </a:p>
+                      </a:txBody>
+                      <a:tcPr>
+                        <a:lnL w="12700" cap="flat" cmpd="sng" algn="ctr">
+                          <a:solidFill>
+                            <a:schemeClr val="tx1"/>
+                          </a:solidFill>
+                          <a:prstDash val="solid"/>
+                          <a:round/>
+                          <a:headEnd type="none" w="med" len="med"/>
+                          <a:tailEnd type="none" w="med" len="med"/>
+                        </a:lnL>
+                      </a:tcPr>
+                    </a:tc>
+                    <a:tc>
+                      <a:txBody>
+                        <a:bodyPr/>
+                        <a:lstStyle/>
+                        <a:p>
+                          <a:r>
+                            <a:rPr lang="en-PH" sz="1400" b="0" dirty="0"/>
+                            <a:t>Warranty and claims</a:t>
+                          </a:r>
+                          <a:endParaRPr lang="en-GB" sz="1400" b="0" dirty="0">
+                            <a:latin typeface="Arial" panose="020B0604020202020204" pitchFamily="34" charset="0"/>
+                            <a:cs typeface="Arial" panose="020B0604020202020204" pitchFamily="34" charset="0"/>
+                          </a:endParaRPr>
+                        </a:p>
+                      </a:txBody>
+                      <a:tcPr/>
+                    </a:tc>
+                    <a:tc>
+                      <a:txBody>
+                        <a:bodyPr/>
+                        <a:lstStyle/>
+                        <a:p>
+                          <a:r>
+                            <a:rPr lang="en-PH" sz="1400" b="0" dirty="0"/>
+                            <a:t>Extent to which HBAT stands behind its product/ service warranties and claims</a:t>
+                          </a:r>
+                          <a:endParaRPr lang="en-GB" sz="1400" b="0" dirty="0">
+                            <a:latin typeface="Arial" panose="020B0604020202020204" pitchFamily="34" charset="0"/>
+                            <a:cs typeface="Arial" panose="020B0604020202020204" pitchFamily="34" charset="0"/>
+                          </a:endParaRPr>
+                        </a:p>
+                      </a:txBody>
+                      <a:tcPr>
+                        <a:lnR w="12700" cap="flat" cmpd="sng" algn="ctr">
+                          <a:solidFill>
+                            <a:schemeClr val="tx1"/>
+                          </a:solidFill>
+                          <a:prstDash val="solid"/>
+                          <a:round/>
+                          <a:headEnd type="none" w="med" len="med"/>
+                          <a:tailEnd type="none" w="med" len="med"/>
+                        </a:lnR>
+                      </a:tcPr>
+                    </a:tc>
+                    <a:extLst>
+                      <a:ext uri="{0D108BD9-81ED-4DB2-BD59-A6C34878D82A}">
+                        <a16:rowId xmlns:a16="http://schemas.microsoft.com/office/drawing/2014/main" val="1149186816"/>
+                      </a:ext>
+                    </a:extLst>
+                  </a:tr>
+                  <a:tr h="526414">
+                    <a:tc>
+                      <a:txBody>
+                        <a:bodyPr/>
+                        <a:lstStyle/>
+                        <a:p>
+                          <a14:m>
+                            <m:oMathPara xmlns:m="http://schemas.openxmlformats.org/officeDocument/2006/math">
+                              <m:oMathParaPr>
+                                <m:jc m:val="centerGroup"/>
+                              </m:oMathParaPr>
+                              <m:oMath xmlns:m="http://schemas.openxmlformats.org/officeDocument/2006/math">
+                                <m:sSub>
+                                  <m:sSubPr>
+                                    <m:ctrlPr>
+                                      <a:rPr lang="en-PH" sz="1400" b="0" smtClean="0"/>
+                                    </m:ctrlPr>
+                                  </m:sSubPr>
+                                  <m:e>
+                                    <m:r>
+                                      <a:rPr lang="en-PH" sz="1400" b="0" smtClean="0"/>
+                                      <m:t>𝑋</m:t>
+                                    </m:r>
+                                  </m:e>
+                                  <m:sub>
+                                    <m:r>
+                                      <a:rPr lang="en-PH" sz="1400" b="0" smtClean="0"/>
+                                      <m:t>15</m:t>
+                                    </m:r>
+                                  </m:sub>
+                                </m:sSub>
+                              </m:oMath>
+                            </m:oMathPara>
+                          </a14:m>
+                          <a:endParaRPr lang="en-GB" sz="1400" b="0" dirty="0">
+                            <a:latin typeface="Arial" panose="020B0604020202020204" pitchFamily="34" charset="0"/>
+                            <a:cs typeface="Arial" panose="020B0604020202020204" pitchFamily="34" charset="0"/>
+                          </a:endParaRPr>
+                        </a:p>
+                      </a:txBody>
+                      <a:tcPr>
+                        <a:lnL w="12700" cap="flat" cmpd="sng" algn="ctr">
+                          <a:solidFill>
+                            <a:schemeClr val="tx1"/>
+                          </a:solidFill>
+                          <a:prstDash val="solid"/>
+                          <a:round/>
+                          <a:headEnd type="none" w="med" len="med"/>
+                          <a:tailEnd type="none" w="med" len="med"/>
+                        </a:lnL>
+                      </a:tcPr>
+                    </a:tc>
+                    <a:tc>
+                      <a:txBody>
+                        <a:bodyPr/>
+                        <a:lstStyle/>
+                        <a:p>
+                          <a:r>
+                            <a:rPr lang="en-PH" sz="1400" b="0" dirty="0"/>
+                            <a:t>New products</a:t>
+                          </a:r>
+                          <a:endParaRPr lang="en-GB" sz="1400" b="0" dirty="0">
+                            <a:latin typeface="Arial" panose="020B0604020202020204" pitchFamily="34" charset="0"/>
+                            <a:cs typeface="Arial" panose="020B0604020202020204" pitchFamily="34" charset="0"/>
+                          </a:endParaRPr>
+                        </a:p>
+                      </a:txBody>
+                      <a:tcPr/>
+                    </a:tc>
+                    <a:tc>
+                      <a:txBody>
+                        <a:bodyPr/>
+                        <a:lstStyle/>
+                        <a:p>
+                          <a:r>
+                            <a:rPr lang="en-PH" sz="1400" b="0" dirty="0"/>
+                            <a:t>Extent to which  HBAT develops and sells new products</a:t>
+                          </a:r>
+                          <a:endParaRPr lang="en-GB" sz="1400" b="0" dirty="0">
+                            <a:latin typeface="Arial" panose="020B0604020202020204" pitchFamily="34" charset="0"/>
+                            <a:cs typeface="Arial" panose="020B0604020202020204" pitchFamily="34" charset="0"/>
+                          </a:endParaRPr>
+                        </a:p>
+                      </a:txBody>
+                      <a:tcPr>
+                        <a:lnR w="12700" cap="flat" cmpd="sng" algn="ctr">
+                          <a:solidFill>
+                            <a:schemeClr val="tx1"/>
+                          </a:solidFill>
+                          <a:prstDash val="solid"/>
+                          <a:round/>
+                          <a:headEnd type="none" w="med" len="med"/>
+                          <a:tailEnd type="none" w="med" len="med"/>
+                        </a:lnR>
+                      </a:tcPr>
+                    </a:tc>
+                    <a:extLst>
+                      <a:ext uri="{0D108BD9-81ED-4DB2-BD59-A6C34878D82A}">
+                        <a16:rowId xmlns:a16="http://schemas.microsoft.com/office/drawing/2014/main" val="898855204"/>
+                      </a:ext>
+                    </a:extLst>
+                  </a:tr>
+                  <a:tr h="526414">
+                    <a:tc>
+                      <a:txBody>
+                        <a:bodyPr/>
+                        <a:lstStyle/>
+                        <a:p>
+                          <a14:m>
+                            <m:oMathPara xmlns:m="http://schemas.openxmlformats.org/officeDocument/2006/math">
+                              <m:oMathParaPr>
+                                <m:jc m:val="centerGroup"/>
+                              </m:oMathParaPr>
+                              <m:oMath xmlns:m="http://schemas.openxmlformats.org/officeDocument/2006/math">
+                                <m:sSub>
+                                  <m:sSubPr>
+                                    <m:ctrlPr>
+                                      <a:rPr lang="en-PH" sz="1400" b="0" smtClean="0"/>
+                                    </m:ctrlPr>
+                                  </m:sSubPr>
+                                  <m:e>
+                                    <m:r>
+                                      <a:rPr lang="en-PH" sz="1400" b="0" smtClean="0"/>
+                                      <m:t>𝑋</m:t>
+                                    </m:r>
+                                  </m:e>
+                                  <m:sub>
+                                    <m:r>
+                                      <a:rPr lang="en-PH" sz="1400" b="0" smtClean="0"/>
+                                      <m:t>16</m:t>
+                                    </m:r>
+                                  </m:sub>
+                                </m:sSub>
+                              </m:oMath>
+                            </m:oMathPara>
+                          </a14:m>
+                          <a:endParaRPr lang="en-GB" sz="1400" b="0" dirty="0">
+                            <a:latin typeface="Arial" panose="020B0604020202020204" pitchFamily="34" charset="0"/>
+                            <a:cs typeface="Arial" panose="020B0604020202020204" pitchFamily="34" charset="0"/>
+                          </a:endParaRPr>
+                        </a:p>
+                      </a:txBody>
+                      <a:tcPr>
+                        <a:lnL w="12700" cap="flat" cmpd="sng" algn="ctr">
+                          <a:solidFill>
+                            <a:schemeClr val="tx1"/>
+                          </a:solidFill>
+                          <a:prstDash val="solid"/>
+                          <a:round/>
+                          <a:headEnd type="none" w="med" len="med"/>
+                          <a:tailEnd type="none" w="med" len="med"/>
+                        </a:lnL>
+                      </a:tcPr>
+                    </a:tc>
+                    <a:tc>
+                      <a:txBody>
+                        <a:bodyPr/>
+                        <a:lstStyle/>
+                        <a:p>
+                          <a:r>
+                            <a:rPr lang="en-PH" sz="1400" b="0" dirty="0"/>
+                            <a:t>Ordering and billing</a:t>
+                          </a:r>
+                          <a:endParaRPr lang="en-GB" sz="1400" b="0" dirty="0">
+                            <a:latin typeface="Arial" panose="020B0604020202020204" pitchFamily="34" charset="0"/>
+                            <a:cs typeface="Arial" panose="020B0604020202020204" pitchFamily="34" charset="0"/>
+                          </a:endParaRPr>
+                        </a:p>
+                      </a:txBody>
+                      <a:tcPr/>
+                    </a:tc>
+                    <a:tc>
+                      <a:txBody>
+                        <a:bodyPr/>
+                        <a:lstStyle/>
+                        <a:p>
+                          <a:r>
+                            <a:rPr lang="en-PH" sz="1400" b="0" dirty="0"/>
+                            <a:t>Perceptions that ordering and billing is handled efficiently and correctly</a:t>
+                          </a:r>
+                          <a:endParaRPr lang="en-GB" sz="1400" b="0" dirty="0">
+                            <a:latin typeface="Arial" panose="020B0604020202020204" pitchFamily="34" charset="0"/>
+                            <a:cs typeface="Arial" panose="020B0604020202020204" pitchFamily="34" charset="0"/>
+                          </a:endParaRPr>
+                        </a:p>
+                      </a:txBody>
+                      <a:tcPr>
+                        <a:lnR w="12700" cap="flat" cmpd="sng" algn="ctr">
+                          <a:solidFill>
+                            <a:schemeClr val="tx1"/>
+                          </a:solidFill>
+                          <a:prstDash val="solid"/>
+                          <a:round/>
+                          <a:headEnd type="none" w="med" len="med"/>
+                          <a:tailEnd type="none" w="med" len="med"/>
+                        </a:lnR>
+                      </a:tcPr>
+                    </a:tc>
+                    <a:extLst>
+                      <a:ext uri="{0D108BD9-81ED-4DB2-BD59-A6C34878D82A}">
+                        <a16:rowId xmlns:a16="http://schemas.microsoft.com/office/drawing/2014/main" val="710683562"/>
+                      </a:ext>
+                    </a:extLst>
+                  </a:tr>
+                  <a:tr h="526414">
+                    <a:tc>
+                      <a:txBody>
+                        <a:bodyPr/>
+                        <a:lstStyle/>
+                        <a:p>
+                          <a14:m>
+                            <m:oMathPara xmlns:m="http://schemas.openxmlformats.org/officeDocument/2006/math">
+                              <m:oMathParaPr>
+                                <m:jc m:val="centerGroup"/>
+                              </m:oMathParaPr>
+                              <m:oMath xmlns:m="http://schemas.openxmlformats.org/officeDocument/2006/math">
+                                <m:sSub>
+                                  <m:sSubPr>
+                                    <m:ctrlPr>
+                                      <a:rPr lang="en-PH" sz="1400" b="0" smtClean="0"/>
+                                    </m:ctrlPr>
+                                  </m:sSubPr>
+                                  <m:e>
+                                    <m:r>
+                                      <a:rPr lang="en-PH" sz="1400" b="0" smtClean="0"/>
+                                      <m:t>𝑋</m:t>
+                                    </m:r>
+                                  </m:e>
+                                  <m:sub>
+                                    <m:r>
+                                      <a:rPr lang="en-PH" sz="1400" b="0" smtClean="0"/>
+                                      <m:t>17</m:t>
+                                    </m:r>
+                                  </m:sub>
+                                </m:sSub>
+                              </m:oMath>
+                            </m:oMathPara>
+                          </a14:m>
+                          <a:endParaRPr lang="en-GB" sz="1400" b="0" dirty="0">
+                            <a:latin typeface="Arial" panose="020B0604020202020204" pitchFamily="34" charset="0"/>
+                            <a:cs typeface="Arial" panose="020B0604020202020204" pitchFamily="34" charset="0"/>
+                          </a:endParaRPr>
+                        </a:p>
+                      </a:txBody>
+                      <a:tcPr>
+                        <a:lnL w="12700" cap="flat" cmpd="sng" algn="ctr">
+                          <a:solidFill>
+                            <a:schemeClr val="tx1"/>
+                          </a:solidFill>
+                          <a:prstDash val="solid"/>
+                          <a:round/>
+                          <a:headEnd type="none" w="med" len="med"/>
+                          <a:tailEnd type="none" w="med" len="med"/>
+                        </a:lnL>
+                      </a:tcPr>
+                    </a:tc>
+                    <a:tc>
+                      <a:txBody>
+                        <a:bodyPr/>
+                        <a:lstStyle/>
+                        <a:p>
+                          <a:r>
+                            <a:rPr lang="en-PH" sz="1400" b="0" dirty="0"/>
+                            <a:t>Price flexibility</a:t>
+                          </a:r>
+                          <a:endParaRPr lang="en-GB" sz="1400" b="0" dirty="0">
+                            <a:latin typeface="Arial" panose="020B0604020202020204" pitchFamily="34" charset="0"/>
+                            <a:cs typeface="Arial" panose="020B0604020202020204" pitchFamily="34" charset="0"/>
+                          </a:endParaRPr>
+                        </a:p>
+                      </a:txBody>
+                      <a:tcPr/>
+                    </a:tc>
+                    <a:tc>
+                      <a:txBody>
+                        <a:bodyPr/>
+                        <a:lstStyle/>
+                        <a:p>
+                          <a:r>
+                            <a:rPr lang="en-PH" sz="1400" b="0" dirty="0"/>
+                            <a:t>Perceived willingness of HBAT sales reps to negotiate price on purchase of paper products</a:t>
+                          </a:r>
+                          <a:endParaRPr lang="en-GB" sz="1400" b="0" dirty="0">
+                            <a:latin typeface="Arial" panose="020B0604020202020204" pitchFamily="34" charset="0"/>
+                            <a:cs typeface="Arial" panose="020B0604020202020204" pitchFamily="34" charset="0"/>
+                          </a:endParaRPr>
+                        </a:p>
+                      </a:txBody>
+                      <a:tcPr>
+                        <a:lnR w="12700" cap="flat" cmpd="sng" algn="ctr">
+                          <a:solidFill>
+                            <a:schemeClr val="tx1"/>
+                          </a:solidFill>
+                          <a:prstDash val="solid"/>
+                          <a:round/>
+                          <a:headEnd type="none" w="med" len="med"/>
+                          <a:tailEnd type="none" w="med" len="med"/>
+                        </a:lnR>
+                      </a:tcPr>
+                    </a:tc>
+                    <a:extLst>
+                      <a:ext uri="{0D108BD9-81ED-4DB2-BD59-A6C34878D82A}">
+                        <a16:rowId xmlns:a16="http://schemas.microsoft.com/office/drawing/2014/main" val="3615121717"/>
+                      </a:ext>
+                    </a:extLst>
+                  </a:tr>
+                  <a:tr h="526414">
+                    <a:tc>
+                      <a:txBody>
+                        <a:bodyPr/>
+                        <a:lstStyle/>
+                        <a:p>
+                          <a14:m>
+                            <m:oMathPara xmlns:m="http://schemas.openxmlformats.org/officeDocument/2006/math">
+                              <m:oMathParaPr>
+                                <m:jc m:val="centerGroup"/>
+                              </m:oMathParaPr>
+                              <m:oMath xmlns:m="http://schemas.openxmlformats.org/officeDocument/2006/math">
+                                <m:sSub>
+                                  <m:sSubPr>
+                                    <m:ctrlPr>
+                                      <a:rPr lang="en-PH" sz="1400" b="0" smtClean="0"/>
+                                    </m:ctrlPr>
+                                  </m:sSubPr>
+                                  <m:e>
+                                    <m:r>
+                                      <a:rPr lang="en-PH" sz="1400" b="0" smtClean="0"/>
+                                      <m:t>𝑋</m:t>
+                                    </m:r>
+                                  </m:e>
+                                  <m:sub>
+                                    <m:r>
+                                      <a:rPr lang="en-PH" sz="1400" b="0" smtClean="0"/>
+                                      <m:t>18</m:t>
+                                    </m:r>
+                                  </m:sub>
+                                </m:sSub>
+                              </m:oMath>
+                            </m:oMathPara>
+                          </a14:m>
+                          <a:endParaRPr lang="en-GB" sz="1400" b="0" dirty="0">
+                            <a:latin typeface="Arial" panose="020B0604020202020204" pitchFamily="34" charset="0"/>
+                            <a:cs typeface="Arial" panose="020B0604020202020204" pitchFamily="34" charset="0"/>
+                          </a:endParaRPr>
+                        </a:p>
+                      </a:txBody>
+                      <a:tcPr>
+                        <a:lnL w="12700" cap="flat" cmpd="sng" algn="ctr">
+                          <a:solidFill>
+                            <a:schemeClr val="tx1"/>
+                          </a:solidFill>
+                          <a:prstDash val="solid"/>
+                          <a:round/>
+                          <a:headEnd type="none" w="med" len="med"/>
+                          <a:tailEnd type="none" w="med" len="med"/>
+                        </a:lnL>
+                        <a:lnB w="12700" cap="flat" cmpd="sng" algn="ctr">
+                          <a:solidFill>
+                            <a:schemeClr val="tx1"/>
+                          </a:solidFill>
+                          <a:prstDash val="solid"/>
+                          <a:round/>
+                          <a:headEnd type="none" w="med" len="med"/>
+                          <a:tailEnd type="none" w="med" len="med"/>
+                        </a:lnB>
+                      </a:tcPr>
+                    </a:tc>
+                    <a:tc>
+                      <a:txBody>
+                        <a:bodyPr/>
+                        <a:lstStyle/>
+                        <a:p>
+                          <a:r>
+                            <a:rPr lang="en-PH" sz="1400" b="0" dirty="0"/>
+                            <a:t>Delivery speed</a:t>
+                          </a:r>
+                          <a:endParaRPr lang="en-GB" sz="1400" b="0" dirty="0">
+                            <a:latin typeface="Arial" panose="020B0604020202020204" pitchFamily="34" charset="0"/>
+                            <a:cs typeface="Arial" panose="020B0604020202020204" pitchFamily="34" charset="0"/>
+                          </a:endParaRPr>
+                        </a:p>
+                      </a:txBody>
+                      <a:tcPr>
+                        <a:lnB w="12700" cap="flat" cmpd="sng" algn="ctr">
+                          <a:solidFill>
+                            <a:schemeClr val="tx1"/>
+                          </a:solidFill>
+                          <a:prstDash val="solid"/>
+                          <a:round/>
+                          <a:headEnd type="none" w="med" len="med"/>
+                          <a:tailEnd type="none" w="med" len="med"/>
+                        </a:lnB>
+                      </a:tcPr>
+                    </a:tc>
+                    <a:tc>
+                      <a:txBody>
+                        <a:bodyPr/>
+                        <a:lstStyle/>
+                        <a:p>
+                          <a:r>
+                            <a:rPr lang="en-PH" sz="1400" b="0" dirty="0"/>
+                            <a:t>Amount of time it takes to deliver the paper product once an order has been confirmed</a:t>
+                          </a:r>
+                          <a:endParaRPr lang="en-GB" sz="1400" b="0" dirty="0">
+                            <a:latin typeface="Arial" panose="020B0604020202020204" pitchFamily="34" charset="0"/>
+                            <a:cs typeface="Arial" panose="020B0604020202020204" pitchFamily="34" charset="0"/>
+                          </a:endParaRPr>
+                        </a:p>
+                      </a:txBody>
+                      <a:tcPr>
+                        <a:lnR w="12700" cap="flat" cmpd="sng" algn="ctr">
+                          <a:solidFill>
+                            <a:schemeClr val="tx1"/>
+                          </a:solidFill>
+                          <a:prstDash val="solid"/>
+                          <a:round/>
+                          <a:headEnd type="none" w="med" len="med"/>
+                          <a:tailEnd type="none" w="med" len="med"/>
+                        </a:lnR>
+                        <a:lnB w="12700" cap="flat" cmpd="sng" algn="ctr">
+                          <a:solidFill>
+                            <a:schemeClr val="tx1"/>
+                          </a:solidFill>
+                          <a:prstDash val="solid"/>
+                          <a:round/>
+                          <a:headEnd type="none" w="med" len="med"/>
+                          <a:tailEnd type="none" w="med" len="med"/>
+                        </a:lnB>
+                      </a:tcPr>
+                    </a:tc>
+                    <a:extLst>
+                      <a:ext uri="{0D108BD9-81ED-4DB2-BD59-A6C34878D82A}">
+                        <a16:rowId xmlns:a16="http://schemas.microsoft.com/office/drawing/2014/main" val="1045023014"/>
+                      </a:ext>
+                    </a:extLst>
+                  </a:tr>
+                </a:tbl>
+              </a:graphicData>
+            </a:graphic>
+          </p:graphicFrame>
+        </mc:Choice>
+        <mc:Fallback>
+          <p:graphicFrame>
+            <p:nvGraphicFramePr>
+              <p:cNvPr id="5" name="Table 4">
+                <a:extLst>
+                  <a:ext uri="{FF2B5EF4-FFF2-40B4-BE49-F238E27FC236}">
+                    <a16:creationId xmlns:a16="http://schemas.microsoft.com/office/drawing/2014/main" id="{DD7DCB67-FF56-41DA-A1D8-ECE9C2881C86}"/>
+                  </a:ext>
+                </a:extLst>
+              </p:cNvPr>
+              <p:cNvGraphicFramePr>
+                <a:graphicFrameLocks noGrp="1"/>
+              </p:cNvGraphicFramePr>
+              <p:nvPr>
+                <p:extLst>
+                  <p:ext uri="{D42A27DB-BD31-4B8C-83A1-F6EECF244321}">
+                    <p14:modId xmlns:p14="http://schemas.microsoft.com/office/powerpoint/2010/main" val="3096543741"/>
+                  </p:ext>
+                </p:extLst>
+              </p:nvPr>
+            </p:nvGraphicFramePr>
+            <p:xfrm>
+              <a:off x="4049234" y="82142"/>
+              <a:ext cx="6850993" cy="6693715"/>
+            </p:xfrm>
+            <a:graphic>
+              <a:graphicData uri="http://schemas.openxmlformats.org/drawingml/2006/table">
+                <a:tbl>
+                  <a:tblPr firstRow="1" bandRow="1">
+                    <a:tableStyleId>{3B4B98B0-60AC-42C2-AFA5-B58CD77FA1E5}</a:tableStyleId>
+                  </a:tblPr>
+                  <a:tblGrid>
+                    <a:gridCol w="608325">
+                      <a:extLst>
+                        <a:ext uri="{9D8B030D-6E8A-4147-A177-3AD203B41FA5}">
+                          <a16:colId xmlns:a16="http://schemas.microsoft.com/office/drawing/2014/main" val="1358090828"/>
+                        </a:ext>
+                      </a:extLst>
+                    </a:gridCol>
+                    <a:gridCol w="1973716">
+                      <a:extLst>
+                        <a:ext uri="{9D8B030D-6E8A-4147-A177-3AD203B41FA5}">
+                          <a16:colId xmlns:a16="http://schemas.microsoft.com/office/drawing/2014/main" val="3394853744"/>
+                        </a:ext>
+                      </a:extLst>
+                    </a:gridCol>
+                    <a:gridCol w="4268952">
+                      <a:extLst>
+                        <a:ext uri="{9D8B030D-6E8A-4147-A177-3AD203B41FA5}">
+                          <a16:colId xmlns:a16="http://schemas.microsoft.com/office/drawing/2014/main" val="2804598532"/>
+                        </a:ext>
+                      </a:extLst>
+                    </a:gridCol>
+                  </a:tblGrid>
+                  <a:tr h="526414">
+                    <a:tc>
+                      <a:txBody>
+                        <a:bodyPr/>
+                        <a:lstStyle/>
+                        <a:p>
+                          <a:endParaRPr lang="en-US"/>
+                        </a:p>
+                      </a:txBody>
+                      <a:tcPr>
+                        <a:lnL w="12700" cap="flat" cmpd="sng" algn="ctr">
+                          <a:solidFill>
+                            <a:schemeClr val="tx1"/>
+                          </a:solidFill>
+                          <a:prstDash val="solid"/>
+                          <a:round/>
+                          <a:headEnd type="none" w="med" len="med"/>
+                          <a:tailEnd type="none" w="med" len="med"/>
+                        </a:lnL>
+                        <a:lnR>
+                          <a:noFill/>
+                        </a:lnR>
+                        <a:lnT w="12700" cap="flat" cmpd="sng" algn="ctr">
+                          <a:solidFill>
+                            <a:schemeClr val="tx1"/>
+                          </a:solidFill>
+                          <a:prstDash val="solid"/>
+                          <a:round/>
+                          <a:headEnd type="none" w="med" len="med"/>
+                          <a:tailEnd type="none" w="med" len="med"/>
+                        </a:lnT>
+                        <a:lnB w="12700" cmpd="sng">
+                          <a:noFill/>
+                        </a:lnB>
+                        <a:lnTlToBr w="12700" cmpd="sng">
+                          <a:noFill/>
+                          <a:prstDash val="solid"/>
+                        </a:lnTlToBr>
+                        <a:lnBlToTr w="12700" cmpd="sng">
+                          <a:noFill/>
+                          <a:prstDash val="solid"/>
+                        </a:lnBlToTr>
+                        <a:blipFill>
+                          <a:blip r:embed="rId2"/>
+                          <a:stretch>
+                            <a:fillRect l="-1000" t="-1163" r="-1027000" b="-1189535"/>
+                          </a:stretch>
+                        </a:blipFill>
+                      </a:tcPr>
+                    </a:tc>
+                    <a:tc>
+                      <a:txBody>
+                        <a:bodyPr/>
+                        <a:lstStyle/>
+                        <a:p>
+                          <a:r>
+                            <a:rPr lang="en-PH" sz="1400" b="0" dirty="0"/>
+                            <a:t>Product quality</a:t>
+                          </a:r>
+                          <a:endParaRPr lang="en-GB" sz="1400" b="0" dirty="0">
+                            <a:latin typeface="Arial" panose="020B0604020202020204" pitchFamily="34" charset="0"/>
+                            <a:cs typeface="Arial" panose="020B0604020202020204" pitchFamily="34" charset="0"/>
+                          </a:endParaRPr>
+                        </a:p>
+                      </a:txBody>
+                      <a:tcPr>
+                        <a:lnL>
+                          <a:noFill/>
+                        </a:lnL>
+                        <a:lnR>
+                          <a:noFill/>
+                        </a:lnR>
+                        <a:lnT w="12700" cap="flat" cmpd="sng" algn="ctr">
+                          <a:solidFill>
+                            <a:schemeClr val="tx1"/>
+                          </a:solidFill>
+                          <a:prstDash val="solid"/>
+                          <a:round/>
+                          <a:headEnd type="none" w="med" len="med"/>
+                          <a:tailEnd type="none" w="med" len="med"/>
+                        </a:lnT>
+                        <a:lnB w="12700" cmpd="sng">
+                          <a:noFill/>
+                        </a:lnB>
+                        <a:lnTlToBr w="12700" cmpd="sng">
+                          <a:noFill/>
+                          <a:prstDash val="solid"/>
+                        </a:lnTlToBr>
+                        <a:lnBlToTr w="12700" cmpd="sng">
+                          <a:noFill/>
+                          <a:prstDash val="solid"/>
+                        </a:lnBlToTr>
+                      </a:tcPr>
+                    </a:tc>
+                    <a:tc>
+                      <a:txBody>
+                        <a:bodyPr/>
+                        <a:lstStyle/>
+                        <a:p>
+                          <a:r>
+                            <a:rPr lang="en-PH" sz="1400" b="0" dirty="0"/>
+                            <a:t>Perceived level of quality of HBAT’s paper products</a:t>
+                          </a:r>
+                          <a:endParaRPr lang="en-GB" sz="1400" b="0" dirty="0">
+                            <a:latin typeface="Arial" panose="020B0604020202020204" pitchFamily="34" charset="0"/>
+                            <a:cs typeface="Arial" panose="020B0604020202020204" pitchFamily="34" charset="0"/>
+                          </a:endParaRPr>
+                        </a:p>
+                      </a:txBody>
+                      <a:tcPr>
+                        <a:lnL>
+                          <a:noFill/>
+                        </a:lnL>
+                        <a:lnR w="12700" cap="flat" cmpd="sng" algn="ctr">
+                          <a:solidFill>
+                            <a:schemeClr val="tx1"/>
+                          </a:solidFill>
+                          <a:prstDash val="solid"/>
+                          <a:round/>
+                          <a:headEnd type="none" w="med" len="med"/>
+                          <a:tailEnd type="none" w="med" len="med"/>
+                        </a:lnR>
+                        <a:lnT w="12700" cap="flat" cmpd="sng" algn="ctr">
+                          <a:solidFill>
+                            <a:schemeClr val="tx1"/>
+                          </a:solidFill>
+                          <a:prstDash val="solid"/>
+                          <a:round/>
+                          <a:headEnd type="none" w="med" len="med"/>
+                          <a:tailEnd type="none" w="med" len="med"/>
+                        </a:lnT>
+                        <a:lnB w="12700" cmpd="sng">
+                          <a:noFill/>
+                        </a:lnB>
+                        <a:lnTlToBr w="12700" cmpd="sng">
+                          <a:noFill/>
+                          <a:prstDash val="solid"/>
+                        </a:lnTlToBr>
+                        <a:lnBlToTr w="12700" cmpd="sng">
+                          <a:noFill/>
+                          <a:prstDash val="solid"/>
+                        </a:lnBlToTr>
+                      </a:tcPr>
+                    </a:tc>
+                    <a:extLst>
+                      <a:ext uri="{0D108BD9-81ED-4DB2-BD59-A6C34878D82A}">
+                        <a16:rowId xmlns:a16="http://schemas.microsoft.com/office/drawing/2014/main" val="168199111"/>
+                      </a:ext>
+                    </a:extLst>
+                  </a:tr>
+                  <a:tr h="376747">
+                    <a:tc>
+                      <a:txBody>
+                        <a:bodyPr/>
+                        <a:lstStyle/>
+                        <a:p>
+                          <a:endParaRPr lang="en-US"/>
+                        </a:p>
+                      </a:txBody>
+                      <a:tcPr>
+                        <a:lnL w="12700" cap="flat" cmpd="sng" algn="ctr">
+                          <a:solidFill>
+                            <a:schemeClr val="tx1"/>
+                          </a:solidFill>
+                          <a:prstDash val="solid"/>
+                          <a:round/>
+                          <a:headEnd type="none" w="med" len="med"/>
+                          <a:tailEnd type="none" w="med" len="med"/>
+                        </a:lnL>
+                        <a:lnT w="12700" cmpd="sng">
+                          <a:noFill/>
+                        </a:lnT>
+                        <a:blipFill>
+                          <a:blip r:embed="rId2"/>
+                          <a:stretch>
+                            <a:fillRect l="-1000" t="-140323" r="-1027000" b="-1550000"/>
+                          </a:stretch>
+                        </a:blipFill>
+                      </a:tcPr>
+                    </a:tc>
+                    <a:tc>
+                      <a:txBody>
+                        <a:bodyPr/>
+                        <a:lstStyle/>
+                        <a:p>
+                          <a:r>
+                            <a:rPr lang="en-PH" sz="1400" b="0" dirty="0"/>
+                            <a:t>E-commerce</a:t>
+                          </a:r>
+                          <a:endParaRPr lang="en-GB" sz="1400" b="0" dirty="0">
+                            <a:latin typeface="Arial" panose="020B0604020202020204" pitchFamily="34" charset="0"/>
+                            <a:cs typeface="Arial" panose="020B0604020202020204" pitchFamily="34" charset="0"/>
+                          </a:endParaRPr>
+                        </a:p>
+                      </a:txBody>
+                      <a:tcPr>
+                        <a:lnT w="12700" cmpd="sng">
+                          <a:noFill/>
+                        </a:lnT>
+                      </a:tcPr>
+                    </a:tc>
+                    <a:tc>
+                      <a:txBody>
+                        <a:bodyPr/>
+                        <a:lstStyle/>
+                        <a:p>
+                          <a:r>
+                            <a:rPr lang="en-PH" sz="1400" b="0" dirty="0"/>
+                            <a:t>Overall image of HBAT’s website; user-friendliness</a:t>
+                          </a:r>
+                          <a:endParaRPr lang="en-GB" sz="1400" b="0" dirty="0">
+                            <a:latin typeface="Arial" panose="020B0604020202020204" pitchFamily="34" charset="0"/>
+                            <a:cs typeface="Arial" panose="020B0604020202020204" pitchFamily="34" charset="0"/>
+                          </a:endParaRPr>
+                        </a:p>
+                      </a:txBody>
+                      <a:tcPr>
+                        <a:lnR w="12700" cap="flat" cmpd="sng" algn="ctr">
+                          <a:solidFill>
+                            <a:schemeClr val="tx1"/>
+                          </a:solidFill>
+                          <a:prstDash val="solid"/>
+                          <a:round/>
+                          <a:headEnd type="none" w="med" len="med"/>
+                          <a:tailEnd type="none" w="med" len="med"/>
+                        </a:lnR>
+                        <a:lnT w="12700" cmpd="sng">
+                          <a:noFill/>
+                        </a:lnT>
+                      </a:tcPr>
+                    </a:tc>
+                    <a:extLst>
+                      <a:ext uri="{0D108BD9-81ED-4DB2-BD59-A6C34878D82A}">
+                        <a16:rowId xmlns:a16="http://schemas.microsoft.com/office/drawing/2014/main" val="3695046256"/>
+                      </a:ext>
+                    </a:extLst>
+                  </a:tr>
+                  <a:tr h="526414">
+                    <a:tc>
+                      <a:txBody>
+                        <a:bodyPr/>
+                        <a:lstStyle/>
+                        <a:p>
+                          <a:endParaRPr lang="en-US"/>
+                        </a:p>
+                      </a:txBody>
+                      <a:tcPr>
+                        <a:lnL w="12700" cap="flat" cmpd="sng" algn="ctr">
+                          <a:solidFill>
+                            <a:schemeClr val="tx1"/>
+                          </a:solidFill>
+                          <a:prstDash val="solid"/>
+                          <a:round/>
+                          <a:headEnd type="none" w="med" len="med"/>
+                          <a:tailEnd type="none" w="med" len="med"/>
+                        </a:lnL>
+                        <a:blipFill>
+                          <a:blip r:embed="rId2"/>
+                          <a:stretch>
+                            <a:fillRect l="-1000" t="-171264" r="-1027000" b="-1004598"/>
+                          </a:stretch>
+                        </a:blipFill>
+                      </a:tcPr>
+                    </a:tc>
+                    <a:tc>
+                      <a:txBody>
+                        <a:bodyPr/>
+                        <a:lstStyle/>
+                        <a:p>
+                          <a:r>
+                            <a:rPr lang="en-PH" sz="1400" b="0" dirty="0"/>
+                            <a:t>Technical support</a:t>
+                          </a:r>
+                          <a:endParaRPr lang="en-GB" sz="1400" b="0" dirty="0">
+                            <a:latin typeface="Arial" panose="020B0604020202020204" pitchFamily="34" charset="0"/>
+                            <a:cs typeface="Arial" panose="020B0604020202020204" pitchFamily="34" charset="0"/>
+                          </a:endParaRPr>
+                        </a:p>
+                      </a:txBody>
+                      <a:tcPr/>
+                    </a:tc>
+                    <a:tc>
+                      <a:txBody>
+                        <a:bodyPr/>
+                        <a:lstStyle/>
+                        <a:p>
+                          <a:r>
+                            <a:rPr lang="en-PH" sz="1400" b="0" dirty="0"/>
+                            <a:t>Extent to which technical support is offered</a:t>
+                          </a:r>
+                          <a:endParaRPr lang="en-GB" sz="1400" b="0" dirty="0">
+                            <a:latin typeface="Arial" panose="020B0604020202020204" pitchFamily="34" charset="0"/>
+                            <a:cs typeface="Arial" panose="020B0604020202020204" pitchFamily="34" charset="0"/>
+                          </a:endParaRPr>
+                        </a:p>
+                      </a:txBody>
+                      <a:tcPr>
+                        <a:lnR w="12700" cap="flat" cmpd="sng" algn="ctr">
+                          <a:solidFill>
+                            <a:schemeClr val="tx1"/>
+                          </a:solidFill>
+                          <a:prstDash val="solid"/>
+                          <a:round/>
+                          <a:headEnd type="none" w="med" len="med"/>
+                          <a:tailEnd type="none" w="med" len="med"/>
+                        </a:lnR>
+                      </a:tcPr>
+                    </a:tc>
+                    <a:extLst>
+                      <a:ext uri="{0D108BD9-81ED-4DB2-BD59-A6C34878D82A}">
+                        <a16:rowId xmlns:a16="http://schemas.microsoft.com/office/drawing/2014/main" val="2372983334"/>
+                      </a:ext>
+                    </a:extLst>
+                  </a:tr>
+                  <a:tr h="526414">
+                    <a:tc>
+                      <a:txBody>
+                        <a:bodyPr/>
+                        <a:lstStyle/>
+                        <a:p>
+                          <a:endParaRPr lang="en-US"/>
+                        </a:p>
+                      </a:txBody>
+                      <a:tcPr>
+                        <a:lnL w="12700" cap="flat" cmpd="sng" algn="ctr">
+                          <a:solidFill>
+                            <a:schemeClr val="tx1"/>
+                          </a:solidFill>
+                          <a:prstDash val="solid"/>
+                          <a:round/>
+                          <a:headEnd type="none" w="med" len="med"/>
+                          <a:tailEnd type="none" w="med" len="med"/>
+                        </a:lnL>
+                        <a:blipFill>
+                          <a:blip r:embed="rId2"/>
+                          <a:stretch>
+                            <a:fillRect l="-1000" t="-274419" r="-1027000" b="-916279"/>
+                          </a:stretch>
+                        </a:blipFill>
+                      </a:tcPr>
+                    </a:tc>
+                    <a:tc>
+                      <a:txBody>
+                        <a:bodyPr/>
+                        <a:lstStyle/>
+                        <a:p>
+                          <a:r>
+                            <a:rPr lang="en-PH" sz="1400" b="0" dirty="0"/>
+                            <a:t>Complaint resolution</a:t>
+                          </a:r>
+                          <a:endParaRPr lang="en-GB" sz="1400" b="0" dirty="0">
+                            <a:latin typeface="Arial" panose="020B0604020202020204" pitchFamily="34" charset="0"/>
+                            <a:cs typeface="Arial" panose="020B0604020202020204" pitchFamily="34" charset="0"/>
+                          </a:endParaRPr>
+                        </a:p>
+                      </a:txBody>
+                      <a:tcPr/>
+                    </a:tc>
+                    <a:tc>
+                      <a:txBody>
+                        <a:bodyPr/>
+                        <a:lstStyle/>
+                        <a:p>
+                          <a:r>
+                            <a:rPr lang="en-PH" sz="1400" b="0" dirty="0"/>
+                            <a:t>Extent to which any complaints are resolved in timely and complete manner</a:t>
+                          </a:r>
+                          <a:endParaRPr lang="en-GB" sz="1400" b="0" dirty="0">
+                            <a:latin typeface="Arial" panose="020B0604020202020204" pitchFamily="34" charset="0"/>
+                            <a:cs typeface="Arial" panose="020B0604020202020204" pitchFamily="34" charset="0"/>
+                          </a:endParaRPr>
+                        </a:p>
+                      </a:txBody>
+                      <a:tcPr>
+                        <a:lnR w="12700" cap="flat" cmpd="sng" algn="ctr">
+                          <a:solidFill>
+                            <a:schemeClr val="tx1"/>
+                          </a:solidFill>
+                          <a:prstDash val="solid"/>
+                          <a:round/>
+                          <a:headEnd type="none" w="med" len="med"/>
+                          <a:tailEnd type="none" w="med" len="med"/>
+                        </a:lnR>
+                      </a:tcPr>
+                    </a:tc>
+                    <a:extLst>
+                      <a:ext uri="{0D108BD9-81ED-4DB2-BD59-A6C34878D82A}">
+                        <a16:rowId xmlns:a16="http://schemas.microsoft.com/office/drawing/2014/main" val="2216671192"/>
+                      </a:ext>
+                    </a:extLst>
+                  </a:tr>
+                  <a:tr h="526414">
+                    <a:tc>
+                      <a:txBody>
+                        <a:bodyPr/>
+                        <a:lstStyle/>
+                        <a:p>
+                          <a:endParaRPr lang="en-US"/>
+                        </a:p>
+                      </a:txBody>
+                      <a:tcPr>
+                        <a:lnL w="12700" cap="flat" cmpd="sng" algn="ctr">
+                          <a:solidFill>
+                            <a:schemeClr val="tx1"/>
+                          </a:solidFill>
+                          <a:prstDash val="solid"/>
+                          <a:round/>
+                          <a:headEnd type="none" w="med" len="med"/>
+                          <a:tailEnd type="none" w="med" len="med"/>
+                        </a:lnL>
+                        <a:blipFill>
+                          <a:blip r:embed="rId2"/>
+                          <a:stretch>
+                            <a:fillRect l="-1000" t="-370115" r="-1027000" b="-805747"/>
+                          </a:stretch>
+                        </a:blipFill>
+                      </a:tcPr>
+                    </a:tc>
+                    <a:tc>
+                      <a:txBody>
+                        <a:bodyPr/>
+                        <a:lstStyle/>
+                        <a:p>
+                          <a:r>
+                            <a:rPr lang="en-PH" sz="1400" b="0" dirty="0"/>
+                            <a:t>Advertising</a:t>
+                          </a:r>
+                          <a:endParaRPr lang="en-GB" sz="1400" b="0" dirty="0">
+                            <a:latin typeface="Arial" panose="020B0604020202020204" pitchFamily="34" charset="0"/>
+                            <a:cs typeface="Arial" panose="020B0604020202020204" pitchFamily="34" charset="0"/>
+                          </a:endParaRPr>
+                        </a:p>
+                      </a:txBody>
+                      <a:tcPr/>
+                    </a:tc>
+                    <a:tc>
+                      <a:txBody>
+                        <a:bodyPr/>
+                        <a:lstStyle/>
+                        <a:p>
+                          <a:r>
+                            <a:rPr lang="en-PH" sz="1400" b="0" dirty="0"/>
+                            <a:t>Perceptions of HBAT’s product line to meet customer needs</a:t>
+                          </a:r>
+                          <a:endParaRPr lang="en-GB" sz="1400" b="0" dirty="0">
+                            <a:latin typeface="Arial" panose="020B0604020202020204" pitchFamily="34" charset="0"/>
+                            <a:cs typeface="Arial" panose="020B0604020202020204" pitchFamily="34" charset="0"/>
+                          </a:endParaRPr>
+                        </a:p>
+                      </a:txBody>
+                      <a:tcPr>
+                        <a:lnR w="12700" cap="flat" cmpd="sng" algn="ctr">
+                          <a:solidFill>
+                            <a:schemeClr val="tx1"/>
+                          </a:solidFill>
+                          <a:prstDash val="solid"/>
+                          <a:round/>
+                          <a:headEnd type="none" w="med" len="med"/>
+                          <a:tailEnd type="none" w="med" len="med"/>
+                        </a:lnR>
+                      </a:tcPr>
+                    </a:tc>
+                    <a:extLst>
+                      <a:ext uri="{0D108BD9-81ED-4DB2-BD59-A6C34878D82A}">
+                        <a16:rowId xmlns:a16="http://schemas.microsoft.com/office/drawing/2014/main" val="3692207160"/>
+                      </a:ext>
+                    </a:extLst>
+                  </a:tr>
+                  <a:tr h="526414">
+                    <a:tc>
+                      <a:txBody>
+                        <a:bodyPr/>
+                        <a:lstStyle/>
+                        <a:p>
+                          <a:endParaRPr lang="en-US"/>
+                        </a:p>
+                      </a:txBody>
+                      <a:tcPr>
+                        <a:lnL w="12700" cap="flat" cmpd="sng" algn="ctr">
+                          <a:solidFill>
+                            <a:schemeClr val="tx1"/>
+                          </a:solidFill>
+                          <a:prstDash val="solid"/>
+                          <a:round/>
+                          <a:headEnd type="none" w="med" len="med"/>
+                          <a:tailEnd type="none" w="med" len="med"/>
+                        </a:lnL>
+                        <a:blipFill>
+                          <a:blip r:embed="rId2"/>
+                          <a:stretch>
+                            <a:fillRect l="-1000" t="-475581" r="-1027000" b="-715116"/>
+                          </a:stretch>
+                        </a:blipFill>
+                      </a:tcPr>
+                    </a:tc>
+                    <a:tc>
+                      <a:txBody>
+                        <a:bodyPr/>
+                        <a:lstStyle/>
+                        <a:p>
+                          <a:r>
+                            <a:rPr lang="en-PH" sz="1400" b="0" dirty="0"/>
+                            <a:t>Product line</a:t>
+                          </a:r>
+                          <a:endParaRPr lang="en-GB" sz="1400" b="0" dirty="0">
+                            <a:latin typeface="Arial" panose="020B0604020202020204" pitchFamily="34" charset="0"/>
+                            <a:cs typeface="Arial" panose="020B0604020202020204" pitchFamily="34" charset="0"/>
+                          </a:endParaRPr>
+                        </a:p>
+                      </a:txBody>
+                      <a:tcPr/>
+                    </a:tc>
+                    <a:tc>
+                      <a:txBody>
+                        <a:bodyPr/>
+                        <a:lstStyle/>
+                        <a:p>
+                          <a:r>
+                            <a:rPr lang="en-PH" sz="1400" b="0" dirty="0"/>
+                            <a:t>Depth and breadth of HBAT’s product line to meet customer needs</a:t>
+                          </a:r>
+                          <a:endParaRPr lang="en-GB" sz="1400" b="0" dirty="0">
+                            <a:latin typeface="Arial" panose="020B0604020202020204" pitchFamily="34" charset="0"/>
+                            <a:cs typeface="Arial" panose="020B0604020202020204" pitchFamily="34" charset="0"/>
+                          </a:endParaRPr>
+                        </a:p>
+                      </a:txBody>
+                      <a:tcPr>
+                        <a:lnR w="12700" cap="flat" cmpd="sng" algn="ctr">
+                          <a:solidFill>
+                            <a:schemeClr val="tx1"/>
+                          </a:solidFill>
+                          <a:prstDash val="solid"/>
+                          <a:round/>
+                          <a:headEnd type="none" w="med" len="med"/>
+                          <a:tailEnd type="none" w="med" len="med"/>
+                        </a:lnR>
+                      </a:tcPr>
+                    </a:tc>
+                    <a:extLst>
+                      <a:ext uri="{0D108BD9-81ED-4DB2-BD59-A6C34878D82A}">
+                        <a16:rowId xmlns:a16="http://schemas.microsoft.com/office/drawing/2014/main" val="83474327"/>
+                      </a:ext>
+                    </a:extLst>
+                  </a:tr>
+                  <a:tr h="526414">
+                    <a:tc>
+                      <a:txBody>
+                        <a:bodyPr/>
+                        <a:lstStyle/>
+                        <a:p>
+                          <a:endParaRPr lang="en-US"/>
+                        </a:p>
+                      </a:txBody>
+                      <a:tcPr>
+                        <a:lnL w="12700" cap="flat" cmpd="sng" algn="ctr">
+                          <a:solidFill>
+                            <a:schemeClr val="tx1"/>
+                          </a:solidFill>
+                          <a:prstDash val="solid"/>
+                          <a:round/>
+                          <a:headEnd type="none" w="med" len="med"/>
+                          <a:tailEnd type="none" w="med" len="med"/>
+                        </a:lnL>
+                        <a:blipFill>
+                          <a:blip r:embed="rId2"/>
+                          <a:stretch>
+                            <a:fillRect l="-1000" t="-575581" r="-1027000" b="-615116"/>
+                          </a:stretch>
+                        </a:blipFill>
+                      </a:tcPr>
+                    </a:tc>
+                    <a:tc>
+                      <a:txBody>
+                        <a:bodyPr/>
+                        <a:lstStyle/>
+                        <a:p>
+                          <a:r>
+                            <a:rPr lang="en-PH" sz="1400" b="0" dirty="0"/>
+                            <a:t>Salesforce image</a:t>
+                          </a:r>
+                          <a:endParaRPr lang="en-GB" sz="1400" b="0" dirty="0">
+                            <a:latin typeface="Arial" panose="020B0604020202020204" pitchFamily="34" charset="0"/>
+                            <a:cs typeface="Arial" panose="020B0604020202020204" pitchFamily="34" charset="0"/>
+                          </a:endParaRPr>
+                        </a:p>
+                      </a:txBody>
+                      <a:tcPr/>
+                    </a:tc>
+                    <a:tc>
+                      <a:txBody>
+                        <a:bodyPr/>
+                        <a:lstStyle/>
+                        <a:p>
+                          <a:r>
+                            <a:rPr lang="en-PH" sz="1400" b="0" dirty="0"/>
+                            <a:t>Overall image of HBAT’s salesforce</a:t>
+                          </a:r>
+                          <a:endParaRPr lang="en-GB" sz="1400" b="0" dirty="0">
+                            <a:latin typeface="Arial" panose="020B0604020202020204" pitchFamily="34" charset="0"/>
+                            <a:cs typeface="Arial" panose="020B0604020202020204" pitchFamily="34" charset="0"/>
+                          </a:endParaRPr>
+                        </a:p>
+                      </a:txBody>
+                      <a:tcPr>
+                        <a:lnR w="12700" cap="flat" cmpd="sng" algn="ctr">
+                          <a:solidFill>
+                            <a:schemeClr val="tx1"/>
+                          </a:solidFill>
+                          <a:prstDash val="solid"/>
+                          <a:round/>
+                          <a:headEnd type="none" w="med" len="med"/>
+                          <a:tailEnd type="none" w="med" len="med"/>
+                        </a:lnR>
+                      </a:tcPr>
+                    </a:tc>
+                    <a:extLst>
+                      <a:ext uri="{0D108BD9-81ED-4DB2-BD59-A6C34878D82A}">
+                        <a16:rowId xmlns:a16="http://schemas.microsoft.com/office/drawing/2014/main" val="2725664331"/>
+                      </a:ext>
+                    </a:extLst>
+                  </a:tr>
+                  <a:tr h="526414">
+                    <a:tc>
+                      <a:txBody>
+                        <a:bodyPr/>
+                        <a:lstStyle/>
+                        <a:p>
+                          <a:endParaRPr lang="en-US"/>
+                        </a:p>
+                      </a:txBody>
+                      <a:tcPr>
+                        <a:lnL w="12700" cap="flat" cmpd="sng" algn="ctr">
+                          <a:solidFill>
+                            <a:schemeClr val="tx1"/>
+                          </a:solidFill>
+                          <a:prstDash val="solid"/>
+                          <a:round/>
+                          <a:headEnd type="none" w="med" len="med"/>
+                          <a:tailEnd type="none" w="med" len="med"/>
+                        </a:lnL>
+                        <a:blipFill>
+                          <a:blip r:embed="rId2"/>
+                          <a:stretch>
+                            <a:fillRect l="-1000" t="-667816" r="-1027000" b="-508046"/>
+                          </a:stretch>
+                        </a:blipFill>
+                      </a:tcPr>
+                    </a:tc>
+                    <a:tc>
+                      <a:txBody>
+                        <a:bodyPr/>
+                        <a:lstStyle/>
+                        <a:p>
+                          <a:r>
+                            <a:rPr lang="en-PH" sz="1400" b="0" dirty="0"/>
+                            <a:t>Competitive pricing</a:t>
+                          </a:r>
+                          <a:endParaRPr lang="en-GB" sz="1400" b="0" dirty="0">
+                            <a:latin typeface="Arial" panose="020B0604020202020204" pitchFamily="34" charset="0"/>
+                            <a:cs typeface="Arial" panose="020B0604020202020204" pitchFamily="34" charset="0"/>
+                          </a:endParaRPr>
+                        </a:p>
+                      </a:txBody>
+                      <a:tcPr/>
+                    </a:tc>
+                    <a:tc>
+                      <a:txBody>
+                        <a:bodyPr/>
+                        <a:lstStyle/>
+                        <a:p>
+                          <a:r>
+                            <a:rPr lang="en-PH" sz="1400" b="0" dirty="0"/>
+                            <a:t>Extent to which HBAT offers competitive prices</a:t>
+                          </a:r>
+                          <a:endParaRPr lang="en-GB" sz="1400" b="0" dirty="0">
+                            <a:latin typeface="Arial" panose="020B0604020202020204" pitchFamily="34" charset="0"/>
+                            <a:cs typeface="Arial" panose="020B0604020202020204" pitchFamily="34" charset="0"/>
+                          </a:endParaRPr>
+                        </a:p>
+                      </a:txBody>
+                      <a:tcPr>
+                        <a:lnR w="12700" cap="flat" cmpd="sng" algn="ctr">
+                          <a:solidFill>
+                            <a:schemeClr val="tx1"/>
+                          </a:solidFill>
+                          <a:prstDash val="solid"/>
+                          <a:round/>
+                          <a:headEnd type="none" w="med" len="med"/>
+                          <a:tailEnd type="none" w="med" len="med"/>
+                        </a:lnR>
+                      </a:tcPr>
+                    </a:tc>
+                    <a:extLst>
+                      <a:ext uri="{0D108BD9-81ED-4DB2-BD59-A6C34878D82A}">
+                        <a16:rowId xmlns:a16="http://schemas.microsoft.com/office/drawing/2014/main" val="1713181456"/>
+                      </a:ext>
+                    </a:extLst>
+                  </a:tr>
+                  <a:tr h="526414">
+                    <a:tc>
+                      <a:txBody>
+                        <a:bodyPr/>
+                        <a:lstStyle/>
+                        <a:p>
+                          <a:endParaRPr lang="en-US"/>
+                        </a:p>
+                      </a:txBody>
+                      <a:tcPr>
+                        <a:lnL w="12700" cap="flat" cmpd="sng" algn="ctr">
+                          <a:solidFill>
+                            <a:schemeClr val="tx1"/>
+                          </a:solidFill>
+                          <a:prstDash val="solid"/>
+                          <a:round/>
+                          <a:headEnd type="none" w="med" len="med"/>
+                          <a:tailEnd type="none" w="med" len="med"/>
+                        </a:lnL>
+                        <a:blipFill>
+                          <a:blip r:embed="rId2"/>
+                          <a:stretch>
+                            <a:fillRect l="-1000" t="-776744" r="-1027000" b="-413953"/>
+                          </a:stretch>
+                        </a:blipFill>
+                      </a:tcPr>
+                    </a:tc>
+                    <a:tc>
+                      <a:txBody>
+                        <a:bodyPr/>
+                        <a:lstStyle/>
+                        <a:p>
+                          <a:r>
+                            <a:rPr lang="en-PH" sz="1400" b="0" dirty="0"/>
+                            <a:t>Warranty and claims</a:t>
+                          </a:r>
+                          <a:endParaRPr lang="en-GB" sz="1400" b="0" dirty="0">
+                            <a:latin typeface="Arial" panose="020B0604020202020204" pitchFamily="34" charset="0"/>
+                            <a:cs typeface="Arial" panose="020B0604020202020204" pitchFamily="34" charset="0"/>
+                          </a:endParaRPr>
+                        </a:p>
+                      </a:txBody>
+                      <a:tcPr/>
+                    </a:tc>
+                    <a:tc>
+                      <a:txBody>
+                        <a:bodyPr/>
+                        <a:lstStyle/>
+                        <a:p>
+                          <a:r>
+                            <a:rPr lang="en-PH" sz="1400" b="0" dirty="0"/>
+                            <a:t>Extent to which HBAT stands behind its product/ service warranties and claims</a:t>
+                          </a:r>
+                          <a:endParaRPr lang="en-GB" sz="1400" b="0" dirty="0">
+                            <a:latin typeface="Arial" panose="020B0604020202020204" pitchFamily="34" charset="0"/>
+                            <a:cs typeface="Arial" panose="020B0604020202020204" pitchFamily="34" charset="0"/>
+                          </a:endParaRPr>
+                        </a:p>
+                      </a:txBody>
+                      <a:tcPr>
+                        <a:lnR w="12700" cap="flat" cmpd="sng" algn="ctr">
+                          <a:solidFill>
+                            <a:schemeClr val="tx1"/>
+                          </a:solidFill>
+                          <a:prstDash val="solid"/>
+                          <a:round/>
+                          <a:headEnd type="none" w="med" len="med"/>
+                          <a:tailEnd type="none" w="med" len="med"/>
+                        </a:lnR>
+                      </a:tcPr>
+                    </a:tc>
+                    <a:extLst>
+                      <a:ext uri="{0D108BD9-81ED-4DB2-BD59-A6C34878D82A}">
+                        <a16:rowId xmlns:a16="http://schemas.microsoft.com/office/drawing/2014/main" val="1149186816"/>
+                      </a:ext>
+                    </a:extLst>
+                  </a:tr>
+                  <a:tr h="526414">
+                    <a:tc>
+                      <a:txBody>
+                        <a:bodyPr/>
+                        <a:lstStyle/>
+                        <a:p>
+                          <a:endParaRPr lang="en-US"/>
+                        </a:p>
+                      </a:txBody>
+                      <a:tcPr>
+                        <a:lnL w="12700" cap="flat" cmpd="sng" algn="ctr">
+                          <a:solidFill>
+                            <a:schemeClr val="tx1"/>
+                          </a:solidFill>
+                          <a:prstDash val="solid"/>
+                          <a:round/>
+                          <a:headEnd type="none" w="med" len="med"/>
+                          <a:tailEnd type="none" w="med" len="med"/>
+                        </a:lnL>
+                        <a:blipFill>
+                          <a:blip r:embed="rId2"/>
+                          <a:stretch>
+                            <a:fillRect l="-1000" t="-866667" r="-1027000" b="-309195"/>
+                          </a:stretch>
+                        </a:blipFill>
+                      </a:tcPr>
+                    </a:tc>
+                    <a:tc>
+                      <a:txBody>
+                        <a:bodyPr/>
+                        <a:lstStyle/>
+                        <a:p>
+                          <a:r>
+                            <a:rPr lang="en-PH" sz="1400" b="0" dirty="0"/>
+                            <a:t>New products</a:t>
+                          </a:r>
+                          <a:endParaRPr lang="en-GB" sz="1400" b="0" dirty="0">
+                            <a:latin typeface="Arial" panose="020B0604020202020204" pitchFamily="34" charset="0"/>
+                            <a:cs typeface="Arial" panose="020B0604020202020204" pitchFamily="34" charset="0"/>
+                          </a:endParaRPr>
+                        </a:p>
+                      </a:txBody>
+                      <a:tcPr/>
+                    </a:tc>
+                    <a:tc>
+                      <a:txBody>
+                        <a:bodyPr/>
+                        <a:lstStyle/>
+                        <a:p>
+                          <a:r>
+                            <a:rPr lang="en-PH" sz="1400" b="0" dirty="0"/>
+                            <a:t>Extent to which  HBAT develops and sells new products</a:t>
+                          </a:r>
+                          <a:endParaRPr lang="en-GB" sz="1400" b="0" dirty="0">
+                            <a:latin typeface="Arial" panose="020B0604020202020204" pitchFamily="34" charset="0"/>
+                            <a:cs typeface="Arial" panose="020B0604020202020204" pitchFamily="34" charset="0"/>
+                          </a:endParaRPr>
+                        </a:p>
+                      </a:txBody>
+                      <a:tcPr>
+                        <a:lnR w="12700" cap="flat" cmpd="sng" algn="ctr">
+                          <a:solidFill>
+                            <a:schemeClr val="tx1"/>
+                          </a:solidFill>
+                          <a:prstDash val="solid"/>
+                          <a:round/>
+                          <a:headEnd type="none" w="med" len="med"/>
+                          <a:tailEnd type="none" w="med" len="med"/>
+                        </a:lnR>
+                      </a:tcPr>
+                    </a:tc>
+                    <a:extLst>
+                      <a:ext uri="{0D108BD9-81ED-4DB2-BD59-A6C34878D82A}">
+                        <a16:rowId xmlns:a16="http://schemas.microsoft.com/office/drawing/2014/main" val="898855204"/>
+                      </a:ext>
+                    </a:extLst>
+                  </a:tr>
+                  <a:tr h="526414">
+                    <a:tc>
+                      <a:txBody>
+                        <a:bodyPr/>
+                        <a:lstStyle/>
+                        <a:p>
+                          <a:endParaRPr lang="en-US"/>
+                        </a:p>
+                      </a:txBody>
+                      <a:tcPr>
+                        <a:lnL w="12700" cap="flat" cmpd="sng" algn="ctr">
+                          <a:solidFill>
+                            <a:schemeClr val="tx1"/>
+                          </a:solidFill>
+                          <a:prstDash val="solid"/>
+                          <a:round/>
+                          <a:headEnd type="none" w="med" len="med"/>
+                          <a:tailEnd type="none" w="med" len="med"/>
+                        </a:lnL>
+                        <a:blipFill>
+                          <a:blip r:embed="rId2"/>
+                          <a:stretch>
+                            <a:fillRect l="-1000" t="-977907" r="-1027000" b="-212791"/>
+                          </a:stretch>
+                        </a:blipFill>
+                      </a:tcPr>
+                    </a:tc>
+                    <a:tc>
+                      <a:txBody>
+                        <a:bodyPr/>
+                        <a:lstStyle/>
+                        <a:p>
+                          <a:r>
+                            <a:rPr lang="en-PH" sz="1400" b="0" dirty="0"/>
+                            <a:t>Ordering and billing</a:t>
+                          </a:r>
+                          <a:endParaRPr lang="en-GB" sz="1400" b="0" dirty="0">
+                            <a:latin typeface="Arial" panose="020B0604020202020204" pitchFamily="34" charset="0"/>
+                            <a:cs typeface="Arial" panose="020B0604020202020204" pitchFamily="34" charset="0"/>
+                          </a:endParaRPr>
+                        </a:p>
+                      </a:txBody>
+                      <a:tcPr/>
+                    </a:tc>
+                    <a:tc>
+                      <a:txBody>
+                        <a:bodyPr/>
+                        <a:lstStyle/>
+                        <a:p>
+                          <a:r>
+                            <a:rPr lang="en-PH" sz="1400" b="0" dirty="0"/>
+                            <a:t>Perceptions that ordering and billing is handled efficiently and correctly</a:t>
+                          </a:r>
+                          <a:endParaRPr lang="en-GB" sz="1400" b="0" dirty="0">
+                            <a:latin typeface="Arial" panose="020B0604020202020204" pitchFamily="34" charset="0"/>
+                            <a:cs typeface="Arial" panose="020B0604020202020204" pitchFamily="34" charset="0"/>
+                          </a:endParaRPr>
+                        </a:p>
+                      </a:txBody>
+                      <a:tcPr>
+                        <a:lnR w="12700" cap="flat" cmpd="sng" algn="ctr">
+                          <a:solidFill>
+                            <a:schemeClr val="tx1"/>
+                          </a:solidFill>
+                          <a:prstDash val="solid"/>
+                          <a:round/>
+                          <a:headEnd type="none" w="med" len="med"/>
+                          <a:tailEnd type="none" w="med" len="med"/>
+                        </a:lnR>
+                      </a:tcPr>
+                    </a:tc>
+                    <a:extLst>
+                      <a:ext uri="{0D108BD9-81ED-4DB2-BD59-A6C34878D82A}">
+                        <a16:rowId xmlns:a16="http://schemas.microsoft.com/office/drawing/2014/main" val="710683562"/>
+                      </a:ext>
+                    </a:extLst>
+                  </a:tr>
+                  <a:tr h="526414">
+                    <a:tc>
+                      <a:txBody>
+                        <a:bodyPr/>
+                        <a:lstStyle/>
+                        <a:p>
+                          <a:endParaRPr lang="en-US"/>
+                        </a:p>
+                      </a:txBody>
+                      <a:tcPr>
+                        <a:lnL w="12700" cap="flat" cmpd="sng" algn="ctr">
+                          <a:solidFill>
+                            <a:schemeClr val="tx1"/>
+                          </a:solidFill>
+                          <a:prstDash val="solid"/>
+                          <a:round/>
+                          <a:headEnd type="none" w="med" len="med"/>
+                          <a:tailEnd type="none" w="med" len="med"/>
+                        </a:lnL>
+                        <a:blipFill>
+                          <a:blip r:embed="rId2"/>
+                          <a:stretch>
+                            <a:fillRect l="-1000" t="-1065517" r="-1027000" b="-110345"/>
+                          </a:stretch>
+                        </a:blipFill>
+                      </a:tcPr>
+                    </a:tc>
+                    <a:tc>
+                      <a:txBody>
+                        <a:bodyPr/>
+                        <a:lstStyle/>
+                        <a:p>
+                          <a:r>
+                            <a:rPr lang="en-PH" sz="1400" b="0" dirty="0"/>
+                            <a:t>Price flexibility</a:t>
+                          </a:r>
+                          <a:endParaRPr lang="en-GB" sz="1400" b="0" dirty="0">
+                            <a:latin typeface="Arial" panose="020B0604020202020204" pitchFamily="34" charset="0"/>
+                            <a:cs typeface="Arial" panose="020B0604020202020204" pitchFamily="34" charset="0"/>
+                          </a:endParaRPr>
+                        </a:p>
+                      </a:txBody>
+                      <a:tcPr/>
+                    </a:tc>
+                    <a:tc>
+                      <a:txBody>
+                        <a:bodyPr/>
+                        <a:lstStyle/>
+                        <a:p>
+                          <a:r>
+                            <a:rPr lang="en-PH" sz="1400" b="0" dirty="0"/>
+                            <a:t>Perceived willingness of HBAT sales reps to negotiate price on purchase of paper products</a:t>
+                          </a:r>
+                          <a:endParaRPr lang="en-GB" sz="1400" b="0" dirty="0">
+                            <a:latin typeface="Arial" panose="020B0604020202020204" pitchFamily="34" charset="0"/>
+                            <a:cs typeface="Arial" panose="020B0604020202020204" pitchFamily="34" charset="0"/>
+                          </a:endParaRPr>
+                        </a:p>
+                      </a:txBody>
+                      <a:tcPr>
+                        <a:lnR w="12700" cap="flat" cmpd="sng" algn="ctr">
+                          <a:solidFill>
+                            <a:schemeClr val="tx1"/>
+                          </a:solidFill>
+                          <a:prstDash val="solid"/>
+                          <a:round/>
+                          <a:headEnd type="none" w="med" len="med"/>
+                          <a:tailEnd type="none" w="med" len="med"/>
+                        </a:lnR>
+                      </a:tcPr>
+                    </a:tc>
+                    <a:extLst>
+                      <a:ext uri="{0D108BD9-81ED-4DB2-BD59-A6C34878D82A}">
+                        <a16:rowId xmlns:a16="http://schemas.microsoft.com/office/drawing/2014/main" val="3615121717"/>
+                      </a:ext>
+                    </a:extLst>
+                  </a:tr>
+                  <a:tr h="526414">
+                    <a:tc>
+                      <a:txBody>
+                        <a:bodyPr/>
+                        <a:lstStyle/>
+                        <a:p>
+                          <a:endParaRPr lang="en-US"/>
+                        </a:p>
+                      </a:txBody>
+                      <a:tcPr>
+                        <a:lnL w="12700" cap="flat" cmpd="sng" algn="ctr">
+                          <a:solidFill>
+                            <a:schemeClr val="tx1"/>
+                          </a:solidFill>
+                          <a:prstDash val="solid"/>
+                          <a:round/>
+                          <a:headEnd type="none" w="med" len="med"/>
+                          <a:tailEnd type="none" w="med" len="med"/>
+                        </a:lnL>
+                        <a:lnB w="12700" cap="flat" cmpd="sng" algn="ctr">
+                          <a:solidFill>
+                            <a:schemeClr val="tx1"/>
+                          </a:solidFill>
+                          <a:prstDash val="solid"/>
+                          <a:round/>
+                          <a:headEnd type="none" w="med" len="med"/>
+                          <a:tailEnd type="none" w="med" len="med"/>
+                        </a:lnB>
+                        <a:blipFill>
+                          <a:blip r:embed="rId2"/>
+                          <a:stretch>
+                            <a:fillRect l="-1000" t="-1179070" r="-1027000" b="-11628"/>
+                          </a:stretch>
+                        </a:blipFill>
+                      </a:tcPr>
+                    </a:tc>
+                    <a:tc>
+                      <a:txBody>
+                        <a:bodyPr/>
+                        <a:lstStyle/>
+                        <a:p>
+                          <a:r>
+                            <a:rPr lang="en-PH" sz="1400" b="0" dirty="0"/>
+                            <a:t>Delivery speed</a:t>
+                          </a:r>
+                          <a:endParaRPr lang="en-GB" sz="1400" b="0" dirty="0">
+                            <a:latin typeface="Arial" panose="020B0604020202020204" pitchFamily="34" charset="0"/>
+                            <a:cs typeface="Arial" panose="020B0604020202020204" pitchFamily="34" charset="0"/>
+                          </a:endParaRPr>
+                        </a:p>
+                      </a:txBody>
+                      <a:tcPr>
+                        <a:lnB w="12700" cap="flat" cmpd="sng" algn="ctr">
+                          <a:solidFill>
+                            <a:schemeClr val="tx1"/>
+                          </a:solidFill>
+                          <a:prstDash val="solid"/>
+                          <a:round/>
+                          <a:headEnd type="none" w="med" len="med"/>
+                          <a:tailEnd type="none" w="med" len="med"/>
+                        </a:lnB>
+                      </a:tcPr>
+                    </a:tc>
+                    <a:tc>
+                      <a:txBody>
+                        <a:bodyPr/>
+                        <a:lstStyle/>
+                        <a:p>
+                          <a:r>
+                            <a:rPr lang="en-PH" sz="1400" b="0" dirty="0"/>
+                            <a:t>Amount of time it takes to deliver the paper product once an order has been confirmed</a:t>
+                          </a:r>
+                          <a:endParaRPr lang="en-GB" sz="1400" b="0" dirty="0">
+                            <a:latin typeface="Arial" panose="020B0604020202020204" pitchFamily="34" charset="0"/>
+                            <a:cs typeface="Arial" panose="020B0604020202020204" pitchFamily="34" charset="0"/>
+                          </a:endParaRPr>
+                        </a:p>
+                      </a:txBody>
+                      <a:tcPr>
+                        <a:lnR w="12700" cap="flat" cmpd="sng" algn="ctr">
+                          <a:solidFill>
+                            <a:schemeClr val="tx1"/>
+                          </a:solidFill>
+                          <a:prstDash val="solid"/>
+                          <a:round/>
+                          <a:headEnd type="none" w="med" len="med"/>
+                          <a:tailEnd type="none" w="med" len="med"/>
+                        </a:lnR>
+                        <a:lnB w="12700" cap="flat" cmpd="sng" algn="ctr">
+                          <a:solidFill>
+                            <a:schemeClr val="tx1"/>
+                          </a:solidFill>
+                          <a:prstDash val="solid"/>
+                          <a:round/>
+                          <a:headEnd type="none" w="med" len="med"/>
+                          <a:tailEnd type="none" w="med" len="med"/>
+                        </a:lnB>
+                      </a:tcPr>
+                    </a:tc>
+                    <a:extLst>
+                      <a:ext uri="{0D108BD9-81ED-4DB2-BD59-A6C34878D82A}">
+                        <a16:rowId xmlns:a16="http://schemas.microsoft.com/office/drawing/2014/main" val="1045023014"/>
+                      </a:ext>
+                    </a:extLst>
+                  </a:tr>
+                </a:tbl>
+              </a:graphicData>
+            </a:graphic>
+          </p:graphicFrame>
+        </mc:Fallback>
+      </mc:AlternateContent>
+    </p:spTree>
+    <p:extLst>
+      <p:ext uri="{BB962C8B-B14F-4D97-AF65-F5344CB8AC3E}">
+        <p14:creationId xmlns:p14="http://schemas.microsoft.com/office/powerpoint/2010/main" val="1579710484"/>
+      </p:ext>
+    </p:extLst>
+  </p:cSld>
+  <p:clrMapOvr>
+    <a:masterClrMapping/>
+  </p:clrMapOvr>
+</p:sld>
+</file>
+
 <file path=ppt/theme/theme1.xml><?xml version="1.0" encoding="utf-8"?>
 <a:theme xmlns:a="http://schemas.openxmlformats.org/drawingml/2006/main" name="Office Theme">
   <a:themeElements>

</xml_diff>